<commit_message>
Tweaked graphics on front cover
Also fixed a typo.
</commit_message>
<xml_diff>
--- a/StudentGuideModule2/132_front_pages/132_front_cover.pptx
+++ b/StudentGuideModule2/132_front_pages/132_front_cover.pptx
@@ -13827,7 +13827,7 @@
         </p:nvGrpSpPr>
         <p:grpSpPr bwMode="auto">
           <a:xfrm>
-            <a:off x="748797" y="7593322"/>
+            <a:off x="624102" y="7593322"/>
             <a:ext cx="2689860" cy="1806575"/>
             <a:chOff x="3779" y="2305"/>
             <a:chExt cx="4236" cy="2845"/>
@@ -14645,7 +14645,7 @@
           </p:nvSpPr>
           <p:spPr bwMode="auto">
             <a:xfrm>
-              <a:off x="5383" y="3438"/>
+              <a:off x="5399" y="3418"/>
               <a:ext cx="512" cy="498"/>
             </a:xfrm>
             <a:prstGeom prst="rect">
@@ -14693,7 +14693,7 @@
                 </a:spcAft>
               </a:pPr>
               <a:r>
-                <a:rPr lang="en-US" sz="1100" i="1">
+                <a:rPr lang="en-US" sz="1100" i="1" dirty="0">
                   <a:effectLst/>
                   <a:latin typeface="Times New Roman"/>
                   <a:ea typeface="Times New Roman"/>
@@ -14701,7 +14701,7 @@
                 </a:rPr>
                 <a:t>c</a:t>
               </a:r>
-              <a:endParaRPr lang="en-US" sz="1100">
+              <a:endParaRPr lang="en-US" sz="1100" dirty="0">
                 <a:effectLst/>
                 <a:latin typeface="Calibri"/>
                 <a:ea typeface="Times New Roman"/>
@@ -15200,7 +15200,7 @@
           </p:nvSpPr>
           <p:spPr bwMode="auto">
             <a:xfrm>
-              <a:off x="5753" y="4359"/>
+              <a:off x="5599" y="4319"/>
               <a:ext cx="512" cy="498"/>
             </a:xfrm>
             <a:prstGeom prst="rect">
@@ -15248,7 +15248,7 @@
                 </a:spcAft>
               </a:pPr>
               <a:r>
-                <a:rPr lang="en-US" sz="1100" i="1">
+                <a:rPr lang="en-US" sz="1100" i="1" dirty="0">
                   <a:effectLst/>
                   <a:latin typeface="Times New Roman"/>
                   <a:ea typeface="Times New Roman"/>
@@ -15256,7 +15256,7 @@
                 </a:rPr>
                 <a:t>d</a:t>
               </a:r>
-              <a:endParaRPr lang="en-US" sz="1100">
+              <a:endParaRPr lang="en-US" sz="1100" dirty="0">
                 <a:effectLst/>
                 <a:latin typeface="Calibri"/>
                 <a:ea typeface="Times New Roman"/>
@@ -15275,7 +15275,7 @@
           </p:nvSpPr>
           <p:spPr bwMode="auto">
             <a:xfrm>
-              <a:off x="6539" y="4224"/>
+              <a:off x="6539" y="4209"/>
               <a:ext cx="931" cy="498"/>
             </a:xfrm>
             <a:prstGeom prst="rect">
@@ -21582,7 +21582,7 @@
         </p:nvGrpSpPr>
         <p:grpSpPr>
           <a:xfrm>
-            <a:off x="716746" y="562430"/>
+            <a:off x="689036" y="562430"/>
             <a:ext cx="1672173" cy="1540502"/>
             <a:chOff x="116009" y="0"/>
             <a:chExt cx="2310199" cy="2128139"/>
@@ -23045,9 +23045,7 @@
             <a:schemeClr val="bg1"/>
           </a:solidFill>
           <a:ln w="50800" cmpd="thickThin">
-            <a:solidFill>
-              <a:schemeClr val="tx1"/>
-            </a:solidFill>
+            <a:noFill/>
           </a:ln>
         </p:spPr>
         <p:txBody>
@@ -23058,15 +23056,18 @@
           <a:p>
             <a:pPr algn="ctr"/>
             <a:r>
-              <a:rPr lang="en-US" sz="4000" b="1" dirty="0" smtClean="0"/>
+              <a:rPr lang="en-US" sz="4000" b="1" i="1" dirty="0" smtClean="0"/>
               <a:t>Physics For Doing!</a:t>
             </a:r>
           </a:p>
           <a:p>
-            <a:pPr algn="ctr"/>
             <a:r>
               <a:rPr lang="en-US" sz="2300" dirty="0" smtClean="0"/>
-              <a:t>Part 2: Activities for Physics 132</a:t>
+              <a:t> Part </a:t>
+            </a:r>
+            <a:r>
+              <a:rPr lang="en-US" sz="2300" dirty="0" smtClean="0"/>
+              <a:t>2: Activities for Physics 132</a:t>
             </a:r>
             <a:endParaRPr lang="en-US" sz="2300" dirty="0"/>
           </a:p>
@@ -24778,6 +24779,44 @@
           </p:txBody>
         </p:sp>
       </p:grpSp>
+      <p:sp>
+        <p:nvSpPr>
+          <p:cNvPr id="155" name="Parallelogram 154"/>
+          <p:cNvSpPr/>
+          <p:nvPr/>
+        </p:nvSpPr>
+        <p:spPr>
+          <a:xfrm>
+            <a:off x="1667641" y="1829943"/>
+            <a:ext cx="4389120" cy="1088136"/>
+          </a:xfrm>
+          <a:prstGeom prst="parallelogram">
+            <a:avLst>
+              <a:gd name="adj" fmla="val 19588"/>
+            </a:avLst>
+          </a:prstGeom>
+          <a:noFill/>
+          <a:ln w="50800" cmpd="thickThin">
+            <a:solidFill>
+              <a:schemeClr val="tx1"/>
+            </a:solidFill>
+          </a:ln>
+        </p:spPr>
+        <p:txBody>
+          <a:bodyPr wrap="square" lIns="101882" tIns="50941" rIns="101882" bIns="50941" rtlCol="0">
+            <a:spAutoFit/>
+          </a:bodyPr>
+          <a:lstStyle/>
+          <a:p>
+            <a:pPr lvl="0" algn="ctr"/>
+            <a:endParaRPr lang="en-US" sz="2300" dirty="0">
+              <a:solidFill>
+                <a:prstClr val="black"/>
+              </a:solidFill>
+            </a:endParaRPr>
+          </a:p>
+        </p:txBody>
+      </p:sp>
     </p:spTree>
     <p:extLst>
       <p:ext uri="{BB962C8B-B14F-4D97-AF65-F5344CB8AC3E}">

</xml_diff>

<commit_message>
More tweaks to front cover
Still trying to fix a problem with transparency color.  Not quite solved
yet....
</commit_message>
<xml_diff>
--- a/StudentGuideModule2/132_front_pages/132_front_cover.pptx
+++ b/StudentGuideModule2/132_front_pages/132_front_cover.pptx
@@ -8,7 +8,7 @@
     <p:sldId id="256" r:id="rId2"/>
   </p:sldIdLst>
   <p:sldSz cx="7772400" cy="10058400"/>
-  <p:notesSz cx="7315200" cy="9601200"/>
+  <p:notesSz cx="7010400" cy="9296400"/>
   <p:defaultTextStyle>
     <a:defPPr>
       <a:defRPr lang="en-US"/>
@@ -289,7 +289,7 @@
             <a:fld id="{1D8BD707-D9CF-40AE-B4C6-C98DA3205C09}" type="datetimeFigureOut">
               <a:rPr lang="en-US" smtClean="0"/>
               <a:pPr/>
-              <a:t>4/24/2016</a:t>
+              <a:t>4/25/2016</a:t>
             </a:fld>
             <a:endParaRPr lang="en-US"/>
           </a:p>
@@ -456,7 +456,7 @@
             <a:fld id="{1D8BD707-D9CF-40AE-B4C6-C98DA3205C09}" type="datetimeFigureOut">
               <a:rPr lang="en-US" smtClean="0"/>
               <a:pPr/>
-              <a:t>4/24/2016</a:t>
+              <a:t>4/25/2016</a:t>
             </a:fld>
             <a:endParaRPr lang="en-US"/>
           </a:p>
@@ -633,7 +633,7 @@
             <a:fld id="{1D8BD707-D9CF-40AE-B4C6-C98DA3205C09}" type="datetimeFigureOut">
               <a:rPr lang="en-US" smtClean="0"/>
               <a:pPr/>
-              <a:t>4/24/2016</a:t>
+              <a:t>4/25/2016</a:t>
             </a:fld>
             <a:endParaRPr lang="en-US"/>
           </a:p>
@@ -800,7 +800,7 @@
             <a:fld id="{1D8BD707-D9CF-40AE-B4C6-C98DA3205C09}" type="datetimeFigureOut">
               <a:rPr lang="en-US" smtClean="0"/>
               <a:pPr/>
-              <a:t>4/24/2016</a:t>
+              <a:t>4/25/2016</a:t>
             </a:fld>
             <a:endParaRPr lang="en-US"/>
           </a:p>
@@ -1043,7 +1043,7 @@
             <a:fld id="{1D8BD707-D9CF-40AE-B4C6-C98DA3205C09}" type="datetimeFigureOut">
               <a:rPr lang="en-US" smtClean="0"/>
               <a:pPr/>
-              <a:t>4/24/2016</a:t>
+              <a:t>4/25/2016</a:t>
             </a:fld>
             <a:endParaRPr lang="en-US"/>
           </a:p>
@@ -1328,7 +1328,7 @@
             <a:fld id="{1D8BD707-D9CF-40AE-B4C6-C98DA3205C09}" type="datetimeFigureOut">
               <a:rPr lang="en-US" smtClean="0"/>
               <a:pPr/>
-              <a:t>4/24/2016</a:t>
+              <a:t>4/25/2016</a:t>
             </a:fld>
             <a:endParaRPr lang="en-US"/>
           </a:p>
@@ -1747,7 +1747,7 @@
             <a:fld id="{1D8BD707-D9CF-40AE-B4C6-C98DA3205C09}" type="datetimeFigureOut">
               <a:rPr lang="en-US" smtClean="0"/>
               <a:pPr/>
-              <a:t>4/24/2016</a:t>
+              <a:t>4/25/2016</a:t>
             </a:fld>
             <a:endParaRPr lang="en-US"/>
           </a:p>
@@ -1862,7 +1862,7 @@
             <a:fld id="{1D8BD707-D9CF-40AE-B4C6-C98DA3205C09}" type="datetimeFigureOut">
               <a:rPr lang="en-US" smtClean="0"/>
               <a:pPr/>
-              <a:t>4/24/2016</a:t>
+              <a:t>4/25/2016</a:t>
             </a:fld>
             <a:endParaRPr lang="en-US"/>
           </a:p>
@@ -1954,7 +1954,7 @@
             <a:fld id="{1D8BD707-D9CF-40AE-B4C6-C98DA3205C09}" type="datetimeFigureOut">
               <a:rPr lang="en-US" smtClean="0"/>
               <a:pPr/>
-              <a:t>4/24/2016</a:t>
+              <a:t>4/25/2016</a:t>
             </a:fld>
             <a:endParaRPr lang="en-US"/>
           </a:p>
@@ -2228,7 +2228,7 @@
             <a:fld id="{1D8BD707-D9CF-40AE-B4C6-C98DA3205C09}" type="datetimeFigureOut">
               <a:rPr lang="en-US" smtClean="0"/>
               <a:pPr/>
-              <a:t>4/24/2016</a:t>
+              <a:t>4/25/2016</a:t>
             </a:fld>
             <a:endParaRPr lang="en-US"/>
           </a:p>
@@ -2478,7 +2478,7 @@
             <a:fld id="{1D8BD707-D9CF-40AE-B4C6-C98DA3205C09}" type="datetimeFigureOut">
               <a:rPr lang="en-US" smtClean="0"/>
               <a:pPr/>
-              <a:t>4/24/2016</a:t>
+              <a:t>4/25/2016</a:t>
             </a:fld>
             <a:endParaRPr lang="en-US"/>
           </a:p>
@@ -2688,7 +2688,7 @@
             <a:fld id="{1D8BD707-D9CF-40AE-B4C6-C98DA3205C09}" type="datetimeFigureOut">
               <a:rPr lang="en-US" smtClean="0"/>
               <a:pPr/>
-              <a:t>4/24/2016</a:t>
+              <a:t>4/25/2016</a:t>
             </a:fld>
             <a:endParaRPr lang="en-US"/>
           </a:p>
@@ -3105,6 +3105,101 @@
           </a:p>
         </p:txBody>
       </p:sp>
+      <p:pic>
+        <p:nvPicPr>
+          <p:cNvPr id="1025" name="Picture 2" descr="C:\Users\mtrawick\Desktop\github\132\StudentGuideModule2\132_front_pages\induction_setup.png"/>
+          <p:cNvPicPr>
+            <a:picLocks noChangeAspect="1" noChangeArrowheads="1"/>
+          </p:cNvPicPr>
+          <p:nvPr/>
+        </p:nvPicPr>
+        <p:blipFill>
+          <a:blip r:embed="rId2" cstate="print">
+            <a:extLst>
+              <a:ext uri="{28A0092B-C50C-407E-A947-70E740481C1C}">
+                <a14:useLocalDpi xmlns:a14="http://schemas.microsoft.com/office/drawing/2010/main" val="0"/>
+              </a:ext>
+            </a:extLst>
+          </a:blip>
+          <a:srcRect/>
+          <a:stretch>
+            <a:fillRect/>
+          </a:stretch>
+        </p:blipFill>
+        <p:spPr bwMode="auto">
+          <a:xfrm>
+            <a:off x="4203598" y="7532436"/>
+            <a:ext cx="2826753" cy="1748803"/>
+          </a:xfrm>
+          <a:prstGeom prst="rect">
+            <a:avLst/>
+          </a:prstGeom>
+          <a:noFill/>
+          <a:extLst>
+            <a:ext uri="{909E8E84-426E-40DD-AFC4-6F175D3DCCD1}">
+              <a14:hiddenFill xmlns:a14="http://schemas.microsoft.com/office/drawing/2010/main">
+                <a:solidFill>
+                  <a:srgbClr val="FFFFFF"/>
+                </a:solidFill>
+              </a14:hiddenFill>
+            </a:ext>
+          </a:extLst>
+        </p:spPr>
+      </p:pic>
+      <p:pic>
+        <p:nvPicPr>
+          <p:cNvPr id="1026" name="RC circuit"/>
+          <p:cNvPicPr>
+            <a:picLocks noChangeAspect="1" noChangeArrowheads="1"/>
+          </p:cNvPicPr>
+          <p:nvPr/>
+        </p:nvPicPr>
+        <p:blipFill>
+          <a:blip r:embed="rId3" cstate="print">
+            <a:extLst>
+              <a:ext uri="{28A0092B-C50C-407E-A947-70E740481C1C}">
+                <a14:useLocalDpi xmlns:a14="http://schemas.microsoft.com/office/drawing/2010/main" val="0"/>
+              </a:ext>
+            </a:extLst>
+          </a:blip>
+          <a:srcRect/>
+          <a:stretch>
+            <a:fillRect/>
+          </a:stretch>
+        </p:blipFill>
+        <p:spPr bwMode="auto">
+          <a:xfrm>
+            <a:off x="3356032" y="5032125"/>
+            <a:ext cx="4038403" cy="1933975"/>
+          </a:xfrm>
+          <a:prstGeom prst="rect">
+            <a:avLst/>
+          </a:prstGeom>
+          <a:noFill/>
+          <a:ln>
+            <a:noFill/>
+          </a:ln>
+          <a:extLst>
+            <a:ext uri="{909E8E84-426E-40DD-AFC4-6F175D3DCCD1}">
+              <a14:hiddenFill xmlns:a14="http://schemas.microsoft.com/office/drawing/2010/main">
+                <a:solidFill>
+                  <a:schemeClr val="accent1"/>
+                </a:solidFill>
+              </a14:hiddenFill>
+            </a:ext>
+            <a:ext uri="{91240B29-F687-4F45-9708-019B960494DF}">
+              <a14:hiddenLine xmlns:a14="http://schemas.microsoft.com/office/drawing/2010/main" w="9525">
+                <a:solidFill>
+                  <a:schemeClr val="tx1"/>
+                </a:solidFill>
+                <a:miter lim="800000"/>
+                <a:headEnd/>
+                <a:tailEnd/>
+              </a14:hiddenLine>
+            </a:ext>
+          </a:extLst>
+        </p:spPr>
+      </p:pic>
       <p:grpSp>
         <p:nvGrpSpPr>
           <p:cNvPr id="95" name="Detector Assembly"/>
@@ -6145,7 +6240,7 @@
                   </a:spcAft>
                 </a:pPr>
                 <a:r>
-                  <a:rPr lang="en-US" sz="400" i="1">
+                  <a:rPr lang="en-US" sz="400" b="1" i="1" dirty="0">
                     <a:solidFill>
                       <a:srgbClr val="FFFFFF"/>
                     </a:solidFill>
@@ -6155,7 +6250,7 @@
                   </a:rPr>
                   <a:t>ROTARY MOTION</a:t>
                 </a:r>
-                <a:endParaRPr lang="en-US" sz="1100">
+                <a:endParaRPr lang="en-US" sz="1100" b="1" dirty="0">
                   <a:effectLst/>
                   <a:ea typeface="Calibri"/>
                   <a:cs typeface="Times New Roman"/>
@@ -6174,7 +6269,7 @@
                   </a:spcAft>
                 </a:pPr>
                 <a:r>
-                  <a:rPr lang="en-US" sz="400" i="1">
+                  <a:rPr lang="en-US" sz="400" b="1" i="1" dirty="0">
                     <a:solidFill>
                       <a:srgbClr val="FFFFFF"/>
                     </a:solidFill>
@@ -6184,7 +6279,7 @@
                   </a:rPr>
                   <a:t>SENSOR</a:t>
                 </a:r>
-                <a:endParaRPr lang="en-US" sz="1100">
+                <a:endParaRPr lang="en-US" sz="1100" b="1" dirty="0">
                   <a:effectLst/>
                   <a:ea typeface="Calibri"/>
                   <a:cs typeface="Times New Roman"/>
@@ -6633,7 +6728,7 @@
                     </a:spcAft>
                   </a:pPr>
                   <a:r>
-                    <a:rPr lang="en-US" sz="300">
+                    <a:rPr lang="en-US" sz="300" b="1" dirty="0">
                       <a:solidFill>
                         <a:srgbClr val="FFFFFF"/>
                       </a:solidFill>
@@ -6643,7 +6738,7 @@
                     </a:rPr>
                     <a:t>GAIN</a:t>
                   </a:r>
-                  <a:endParaRPr lang="en-US" sz="1100">
+                  <a:endParaRPr lang="en-US" sz="1100" b="1" dirty="0">
                     <a:effectLst/>
                     <a:ea typeface="Calibri"/>
                     <a:cs typeface="Times New Roman"/>
@@ -6706,7 +6801,7 @@
                     </a:spcAft>
                   </a:pPr>
                   <a:r>
-                    <a:rPr lang="en-US" sz="300">
+                    <a:rPr lang="en-US" sz="300" b="1" dirty="0">
                       <a:solidFill>
                         <a:srgbClr val="FFFFFF"/>
                       </a:solidFill>
@@ -6716,7 +6811,7 @@
                     </a:rPr>
                     <a:t>1</a:t>
                   </a:r>
-                  <a:endParaRPr lang="en-US" sz="1100">
+                  <a:endParaRPr lang="en-US" sz="1100" b="1" dirty="0">
                     <a:effectLst/>
                     <a:ea typeface="Calibri"/>
                     <a:cs typeface="Times New Roman"/>
@@ -6735,7 +6830,7 @@
                     </a:spcAft>
                   </a:pPr>
                   <a:r>
-                    <a:rPr lang="en-US" sz="300">
+                    <a:rPr lang="en-US" sz="300" b="1" dirty="0">
                       <a:solidFill>
                         <a:srgbClr val="FFFFFF"/>
                       </a:solidFill>
@@ -6745,7 +6840,7 @@
                     </a:rPr>
                     <a:t>10</a:t>
                   </a:r>
-                  <a:endParaRPr lang="en-US" sz="1100">
+                  <a:endParaRPr lang="en-US" sz="1100" b="1" dirty="0">
                     <a:effectLst/>
                     <a:ea typeface="Calibri"/>
                     <a:cs typeface="Times New Roman"/>
@@ -6764,7 +6859,7 @@
                     </a:spcAft>
                   </a:pPr>
                   <a:r>
-                    <a:rPr lang="en-US" sz="300">
+                    <a:rPr lang="en-US" sz="300" b="1" dirty="0">
                       <a:solidFill>
                         <a:srgbClr val="FFFFFF"/>
                       </a:solidFill>
@@ -6774,7 +6869,7 @@
                     </a:rPr>
                     <a:t>100</a:t>
                   </a:r>
-                  <a:endParaRPr lang="en-US" sz="1100">
+                  <a:endParaRPr lang="en-US" sz="1100" b="1" dirty="0">
                     <a:effectLst/>
                     <a:ea typeface="Calibri"/>
                     <a:cs typeface="Times New Roman"/>
@@ -6793,7 +6888,7 @@
                     </a:spcAft>
                   </a:pPr>
                   <a:r>
-                    <a:rPr lang="en-US" sz="200">
+                    <a:rPr lang="en-US" sz="200" b="1" dirty="0">
                       <a:solidFill>
                         <a:srgbClr val="FFFFFF"/>
                       </a:solidFill>
@@ -6803,7 +6898,7 @@
                     </a:rPr>
                     <a:t> </a:t>
                   </a:r>
-                  <a:endParaRPr lang="en-US" sz="1100">
+                  <a:endParaRPr lang="en-US" sz="1100" b="1" dirty="0">
                     <a:effectLst/>
                     <a:ea typeface="Calibri"/>
                     <a:cs typeface="Times New Roman"/>
@@ -11689,7 +11784,7 @@
                   <a:avLst/>
                 </a:prstGeom>
                 <a:blipFill rotWithShape="1">
-                  <a:blip r:embed="rId2"/>
+                  <a:blip r:embed="rId4"/>
                   <a:stretch>
                     <a:fillRect/>
                   </a:stretch>
@@ -13146,7 +13241,7 @@
                   <a:avLst/>
                 </a:prstGeom>
                 <a:blipFill rotWithShape="1">
-                  <a:blip r:embed="rId3"/>
+                  <a:blip r:embed="rId5"/>
                   <a:stretch>
                     <a:fillRect/>
                   </a:stretch>
@@ -13588,7 +13683,7 @@
                       <a:avLst/>
                     </a:prstGeom>
                     <a:blipFill rotWithShape="1">
-                      <a:blip r:embed="rId4"/>
+                      <a:blip r:embed="rId6"/>
                       <a:stretch>
                         <a:fillRect/>
                       </a:stretch>
@@ -13911,7 +14006,7 @@
                     <a:avLst/>
                   </a:prstGeom>
                   <a:blipFill rotWithShape="1">
-                    <a:blip r:embed="rId5"/>
+                    <a:blip r:embed="rId7"/>
                     <a:stretch>
                       <a:fillRect/>
                     </a:stretch>
@@ -14728,7 +14823,7 @@
                 </a:spcAft>
               </a:pPr>
               <a:r>
-                <a:rPr lang="en-US" sz="1100" i="1">
+                <a:rPr lang="en-US" sz="1200" i="1" dirty="0">
                   <a:solidFill>
                     <a:schemeClr val="bg1"/>
                   </a:solidFill>
@@ -14739,7 +14834,7 @@
                 </a:rPr>
                 <a:t>a</a:t>
               </a:r>
-              <a:endParaRPr lang="en-US" sz="1100">
+              <a:endParaRPr lang="en-US" sz="1200" dirty="0">
                 <a:solidFill>
                   <a:schemeClr val="bg1"/>
                 </a:solidFill>
@@ -14761,7 +14856,7 @@
           </p:nvSpPr>
           <p:spPr bwMode="auto">
             <a:xfrm>
-              <a:off x="5399" y="3418"/>
+              <a:off x="5393" y="3394"/>
               <a:ext cx="512" cy="498"/>
             </a:xfrm>
             <a:prstGeom prst="rect">
@@ -14802,7 +14897,7 @@
                 </a:spcAft>
               </a:pPr>
               <a:r>
-                <a:rPr lang="en-US" sz="1100" i="1" dirty="0">
+                <a:rPr lang="en-US" sz="1200" i="1" dirty="0">
                   <a:solidFill>
                     <a:schemeClr val="bg1"/>
                   </a:solidFill>
@@ -14813,7 +14908,7 @@
                 </a:rPr>
                 <a:t>c</a:t>
               </a:r>
-              <a:endParaRPr lang="en-US" sz="1100" dirty="0">
+              <a:endParaRPr lang="en-US" sz="1200" dirty="0">
                 <a:solidFill>
                   <a:schemeClr val="bg1"/>
                 </a:solidFill>
@@ -14835,7 +14930,7 @@
           </p:nvSpPr>
           <p:spPr bwMode="auto">
             <a:xfrm>
-              <a:off x="4677" y="2505"/>
+              <a:off x="4653" y="2487"/>
               <a:ext cx="512" cy="498"/>
             </a:xfrm>
             <a:prstGeom prst="rect">
@@ -14876,7 +14971,7 @@
                 </a:spcAft>
               </a:pPr>
               <a:r>
-                <a:rPr lang="en-US" sz="1100" i="1">
+                <a:rPr lang="en-US" sz="1200" i="1" dirty="0">
                   <a:solidFill>
                     <a:schemeClr val="bg1"/>
                   </a:solidFill>
@@ -14887,7 +14982,7 @@
                 </a:rPr>
                 <a:t>b</a:t>
               </a:r>
-              <a:endParaRPr lang="en-US" sz="1100">
+              <a:endParaRPr lang="en-US" sz="1200" dirty="0">
                 <a:solidFill>
                   <a:schemeClr val="bg1"/>
                 </a:solidFill>
@@ -15314,7 +15409,7 @@
           </p:nvSpPr>
           <p:spPr bwMode="auto">
             <a:xfrm>
-              <a:off x="5599" y="4319"/>
+              <a:off x="5824" y="4093"/>
               <a:ext cx="512" cy="498"/>
             </a:xfrm>
             <a:prstGeom prst="rect">
@@ -15355,7 +15450,7 @@
                 </a:spcAft>
               </a:pPr>
               <a:r>
-                <a:rPr lang="en-US" sz="1100" i="1" dirty="0">
+                <a:rPr lang="en-US" sz="1200" i="1" dirty="0">
                   <a:solidFill>
                     <a:schemeClr val="bg1"/>
                   </a:solidFill>
@@ -15366,7 +15461,7 @@
                 </a:rPr>
                 <a:t>d</a:t>
               </a:r>
-              <a:endParaRPr lang="en-US" sz="1100" dirty="0">
+              <a:endParaRPr lang="en-US" sz="1200" dirty="0">
                 <a:solidFill>
                   <a:schemeClr val="bg1"/>
                 </a:solidFill>
@@ -16534,7 +16629,7 @@
                   <a:avLst/>
                 </a:prstGeom>
                 <a:blipFill rotWithShape="1">
-                  <a:blip r:embed="rId6"/>
+                  <a:blip r:embed="rId8"/>
                   <a:stretch>
                     <a:fillRect b="-13043"/>
                   </a:stretch>
@@ -16814,7 +16909,7 @@
                   <a:avLst/>
                 </a:prstGeom>
                 <a:blipFill rotWithShape="1">
-                  <a:blip r:embed="rId7"/>
+                  <a:blip r:embed="rId9"/>
                   <a:stretch>
                     <a:fillRect/>
                   </a:stretch>
@@ -17057,7 +17152,7 @@
                   <a:avLst/>
                 </a:prstGeom>
                 <a:blipFill rotWithShape="1">
-                  <a:blip r:embed="rId8"/>
+                  <a:blip r:embed="rId10"/>
                   <a:stretch>
                     <a:fillRect/>
                   </a:stretch>
@@ -17784,473 +17879,12 @@
         </p:nvGrpSpPr>
         <p:grpSpPr>
           <a:xfrm>
-            <a:off x="3802043" y="6402651"/>
-            <a:ext cx="3190240" cy="3376295"/>
-            <a:chOff x="3967597" y="6586220"/>
-            <a:chExt cx="3190240" cy="3376295"/>
+            <a:off x="5112048" y="7172960"/>
+            <a:ext cx="947420" cy="309828"/>
+            <a:chOff x="5277602" y="7356529"/>
+            <a:chExt cx="947420" cy="309828"/>
           </a:xfrm>
         </p:grpSpPr>
-        <p:sp>
-          <p:nvSpPr>
-            <p:cNvPr id="476" name="Freeform 475"/>
-            <p:cNvSpPr/>
-            <p:nvPr/>
-          </p:nvSpPr>
-          <p:spPr>
-            <a:xfrm>
-              <a:off x="6033252" y="7727950"/>
-              <a:ext cx="961390" cy="1022985"/>
-            </a:xfrm>
-            <a:custGeom>
-              <a:avLst/>
-              <a:gdLst>
-                <a:gd name="connsiteX0" fmla="*/ 465871 w 923285"/>
-                <a:gd name="connsiteY0" fmla="*/ 1089660 h 1089660"/>
-                <a:gd name="connsiteX1" fmla="*/ 915451 w 923285"/>
-                <a:gd name="connsiteY1" fmla="*/ 792480 h 1089660"/>
-                <a:gd name="connsiteX2" fmla="*/ 130591 w 923285"/>
-                <a:gd name="connsiteY2" fmla="*/ 419100 h 1089660"/>
-                <a:gd name="connsiteX3" fmla="*/ 8671 w 923285"/>
-                <a:gd name="connsiteY3" fmla="*/ 0 h 1089660"/>
-                <a:gd name="connsiteX0" fmla="*/ 460444 w 660973"/>
-                <a:gd name="connsiteY0" fmla="*/ 1089660 h 1089660"/>
-                <a:gd name="connsiteX1" fmla="*/ 620266 w 660973"/>
-                <a:gd name="connsiteY1" fmla="*/ 845820 h 1089660"/>
-                <a:gd name="connsiteX2" fmla="*/ 125164 w 660973"/>
-                <a:gd name="connsiteY2" fmla="*/ 419100 h 1089660"/>
-                <a:gd name="connsiteX3" fmla="*/ 3244 w 660973"/>
-                <a:gd name="connsiteY3" fmla="*/ 0 h 1089660"/>
-                <a:gd name="connsiteX0" fmla="*/ 800881 w 1001410"/>
-                <a:gd name="connsiteY0" fmla="*/ 1005840 h 1005840"/>
-                <a:gd name="connsiteX1" fmla="*/ 960703 w 1001410"/>
-                <a:gd name="connsiteY1" fmla="*/ 762000 h 1005840"/>
-                <a:gd name="connsiteX2" fmla="*/ 465601 w 1001410"/>
-                <a:gd name="connsiteY2" fmla="*/ 335280 h 1005840"/>
-                <a:gd name="connsiteX3" fmla="*/ 483 w 1001410"/>
-                <a:gd name="connsiteY3" fmla="*/ 0 h 1005840"/>
-                <a:gd name="connsiteX0" fmla="*/ 803302 w 1024426"/>
-                <a:gd name="connsiteY0" fmla="*/ 1005840 h 1005840"/>
-                <a:gd name="connsiteX1" fmla="*/ 963124 w 1024426"/>
-                <a:gd name="connsiteY1" fmla="*/ 762000 h 1005840"/>
-                <a:gd name="connsiteX2" fmla="*/ 185720 w 1024426"/>
-                <a:gd name="connsiteY2" fmla="*/ 320040 h 1005840"/>
-                <a:gd name="connsiteX3" fmla="*/ 2904 w 1024426"/>
-                <a:gd name="connsiteY3" fmla="*/ 0 h 1005840"/>
-                <a:gd name="connsiteX0" fmla="*/ 744263 w 1004687"/>
-                <a:gd name="connsiteY0" fmla="*/ 1023047 h 1023047"/>
-                <a:gd name="connsiteX1" fmla="*/ 963124 w 1004687"/>
-                <a:gd name="connsiteY1" fmla="*/ 762000 h 1023047"/>
-                <a:gd name="connsiteX2" fmla="*/ 185720 w 1004687"/>
-                <a:gd name="connsiteY2" fmla="*/ 320040 h 1023047"/>
-                <a:gd name="connsiteX3" fmla="*/ 2904 w 1004687"/>
-                <a:gd name="connsiteY3" fmla="*/ 0 h 1023047"/>
-                <a:gd name="connsiteX0" fmla="*/ 707847 w 968271"/>
-                <a:gd name="connsiteY0" fmla="*/ 1023047 h 1023047"/>
-                <a:gd name="connsiteX1" fmla="*/ 926708 w 968271"/>
-                <a:gd name="connsiteY1" fmla="*/ 762000 h 1023047"/>
-                <a:gd name="connsiteX2" fmla="*/ 149304 w 968271"/>
-                <a:gd name="connsiteY2" fmla="*/ 320040 h 1023047"/>
-                <a:gd name="connsiteX3" fmla="*/ 5429 w 968271"/>
-                <a:gd name="connsiteY3" fmla="*/ 0 h 1023047"/>
-                <a:gd name="connsiteX0" fmla="*/ 702418 w 962842"/>
-                <a:gd name="connsiteY0" fmla="*/ 1023047 h 1023047"/>
-                <a:gd name="connsiteX1" fmla="*/ 921279 w 962842"/>
-                <a:gd name="connsiteY1" fmla="*/ 762000 h 1023047"/>
-                <a:gd name="connsiteX2" fmla="*/ 143875 w 962842"/>
-                <a:gd name="connsiteY2" fmla="*/ 320040 h 1023047"/>
-                <a:gd name="connsiteX3" fmla="*/ 0 w 962842"/>
-                <a:gd name="connsiteY3" fmla="*/ 0 h 1023047"/>
-              </a:gdLst>
-              <a:ahLst/>
-              <a:cxnLst>
-                <a:cxn ang="0">
-                  <a:pos x="connsiteX0" y="connsiteY0"/>
-                </a:cxn>
-                <a:cxn ang="0">
-                  <a:pos x="connsiteX1" y="connsiteY1"/>
-                </a:cxn>
-                <a:cxn ang="0">
-                  <a:pos x="connsiteX2" y="connsiteY2"/>
-                </a:cxn>
-                <a:cxn ang="0">
-                  <a:pos x="connsiteX3" y="connsiteY3"/>
-                </a:cxn>
-              </a:cxnLst>
-              <a:rect l="l" t="t" r="r" b="b"/>
-              <a:pathLst>
-                <a:path w="962842" h="1023047">
-                  <a:moveTo>
-                    <a:pt x="702418" y="1023047"/>
-                  </a:moveTo>
-                  <a:cubicBezTo>
-                    <a:pt x="955148" y="930337"/>
-                    <a:pt x="1014370" y="879168"/>
-                    <a:pt x="921279" y="762000"/>
-                  </a:cubicBezTo>
-                  <a:cubicBezTo>
-                    <a:pt x="828189" y="644832"/>
-                    <a:pt x="297421" y="447040"/>
-                    <a:pt x="143875" y="320040"/>
-                  </a:cubicBezTo>
-                  <a:cubicBezTo>
-                    <a:pt x="-9671" y="193040"/>
-                    <a:pt x="2633" y="145968"/>
-                    <a:pt x="0" y="0"/>
-                  </a:cubicBezTo>
-                </a:path>
-              </a:pathLst>
-            </a:custGeom>
-            <a:noFill/>
-            <a:ln>
-              <a:solidFill>
-                <a:schemeClr val="bg1"/>
-              </a:solidFill>
-            </a:ln>
-          </p:spPr>
-          <p:style>
-            <a:lnRef idx="2">
-              <a:schemeClr val="accent1">
-                <a:shade val="50000"/>
-              </a:schemeClr>
-            </a:lnRef>
-            <a:fillRef idx="1">
-              <a:schemeClr val="accent1"/>
-            </a:fillRef>
-            <a:effectRef idx="0">
-              <a:schemeClr val="accent1"/>
-            </a:effectRef>
-            <a:fontRef idx="minor">
-              <a:schemeClr val="lt1"/>
-            </a:fontRef>
-          </p:style>
-          <p:txBody>
-            <a:bodyPr rot="0" spcFirstLastPara="0" vert="horz" wrap="square" lIns="91440" tIns="45720" rIns="91440" bIns="45720" numCol="1" spcCol="0" rtlCol="0" fromWordArt="0" anchor="ctr" anchorCtr="0" forceAA="0" compatLnSpc="1">
-              <a:prstTxWarp prst="textNoShape">
-                <a:avLst/>
-              </a:prstTxWarp>
-              <a:noAutofit/>
-            </a:bodyPr>
-            <a:lstStyle/>
-            <a:p>
-              <a:endParaRPr lang="en-US"/>
-            </a:p>
-          </p:txBody>
-        </p:sp>
-        <p:sp>
-          <p:nvSpPr>
-            <p:cNvPr id="477" name="Freeform 476"/>
-            <p:cNvSpPr/>
-            <p:nvPr/>
-          </p:nvSpPr>
-          <p:spPr>
-            <a:xfrm>
-              <a:off x="6226927" y="7727950"/>
-              <a:ext cx="930910" cy="1094105"/>
-            </a:xfrm>
-            <a:custGeom>
-              <a:avLst/>
-              <a:gdLst>
-                <a:gd name="connsiteX0" fmla="*/ 465871 w 923285"/>
-                <a:gd name="connsiteY0" fmla="*/ 1089660 h 1089660"/>
-                <a:gd name="connsiteX1" fmla="*/ 915451 w 923285"/>
-                <a:gd name="connsiteY1" fmla="*/ 792480 h 1089660"/>
-                <a:gd name="connsiteX2" fmla="*/ 130591 w 923285"/>
-                <a:gd name="connsiteY2" fmla="*/ 419100 h 1089660"/>
-                <a:gd name="connsiteX3" fmla="*/ 8671 w 923285"/>
-                <a:gd name="connsiteY3" fmla="*/ 0 h 1089660"/>
-                <a:gd name="connsiteX0" fmla="*/ 460444 w 660973"/>
-                <a:gd name="connsiteY0" fmla="*/ 1089660 h 1089660"/>
-                <a:gd name="connsiteX1" fmla="*/ 620266 w 660973"/>
-                <a:gd name="connsiteY1" fmla="*/ 845820 h 1089660"/>
-                <a:gd name="connsiteX2" fmla="*/ 125164 w 660973"/>
-                <a:gd name="connsiteY2" fmla="*/ 419100 h 1089660"/>
-                <a:gd name="connsiteX3" fmla="*/ 3244 w 660973"/>
-                <a:gd name="connsiteY3" fmla="*/ 0 h 1089660"/>
-                <a:gd name="connsiteX0" fmla="*/ 800881 w 1001410"/>
-                <a:gd name="connsiteY0" fmla="*/ 1005840 h 1005840"/>
-                <a:gd name="connsiteX1" fmla="*/ 960703 w 1001410"/>
-                <a:gd name="connsiteY1" fmla="*/ 762000 h 1005840"/>
-                <a:gd name="connsiteX2" fmla="*/ 465601 w 1001410"/>
-                <a:gd name="connsiteY2" fmla="*/ 335280 h 1005840"/>
-                <a:gd name="connsiteX3" fmla="*/ 483 w 1001410"/>
-                <a:gd name="connsiteY3" fmla="*/ 0 h 1005840"/>
-                <a:gd name="connsiteX0" fmla="*/ 803302 w 1024426"/>
-                <a:gd name="connsiteY0" fmla="*/ 1005840 h 1005840"/>
-                <a:gd name="connsiteX1" fmla="*/ 963124 w 1024426"/>
-                <a:gd name="connsiteY1" fmla="*/ 762000 h 1005840"/>
-                <a:gd name="connsiteX2" fmla="*/ 185720 w 1024426"/>
-                <a:gd name="connsiteY2" fmla="*/ 320040 h 1005840"/>
-                <a:gd name="connsiteX3" fmla="*/ 2904 w 1024426"/>
-                <a:gd name="connsiteY3" fmla="*/ 0 h 1005840"/>
-                <a:gd name="connsiteX0" fmla="*/ 744263 w 1004687"/>
-                <a:gd name="connsiteY0" fmla="*/ 1023047 h 1023047"/>
-                <a:gd name="connsiteX1" fmla="*/ 963124 w 1004687"/>
-                <a:gd name="connsiteY1" fmla="*/ 762000 h 1023047"/>
-                <a:gd name="connsiteX2" fmla="*/ 185720 w 1004687"/>
-                <a:gd name="connsiteY2" fmla="*/ 320040 h 1023047"/>
-                <a:gd name="connsiteX3" fmla="*/ 2904 w 1004687"/>
-                <a:gd name="connsiteY3" fmla="*/ 0 h 1023047"/>
-                <a:gd name="connsiteX0" fmla="*/ 707847 w 968271"/>
-                <a:gd name="connsiteY0" fmla="*/ 1023047 h 1023047"/>
-                <a:gd name="connsiteX1" fmla="*/ 926708 w 968271"/>
-                <a:gd name="connsiteY1" fmla="*/ 762000 h 1023047"/>
-                <a:gd name="connsiteX2" fmla="*/ 149304 w 968271"/>
-                <a:gd name="connsiteY2" fmla="*/ 320040 h 1023047"/>
-                <a:gd name="connsiteX3" fmla="*/ 5429 w 968271"/>
-                <a:gd name="connsiteY3" fmla="*/ 0 h 1023047"/>
-                <a:gd name="connsiteX0" fmla="*/ 702418 w 962842"/>
-                <a:gd name="connsiteY0" fmla="*/ 1023047 h 1023047"/>
-                <a:gd name="connsiteX1" fmla="*/ 921279 w 962842"/>
-                <a:gd name="connsiteY1" fmla="*/ 762000 h 1023047"/>
-                <a:gd name="connsiteX2" fmla="*/ 143875 w 962842"/>
-                <a:gd name="connsiteY2" fmla="*/ 320040 h 1023047"/>
-                <a:gd name="connsiteX3" fmla="*/ 0 w 962842"/>
-                <a:gd name="connsiteY3" fmla="*/ 0 h 1023047"/>
-                <a:gd name="connsiteX0" fmla="*/ 520247 w 932436"/>
-                <a:gd name="connsiteY0" fmla="*/ 1094334 h 1094334"/>
-                <a:gd name="connsiteX1" fmla="*/ 921279 w 932436"/>
-                <a:gd name="connsiteY1" fmla="*/ 762000 h 1094334"/>
-                <a:gd name="connsiteX2" fmla="*/ 143875 w 932436"/>
-                <a:gd name="connsiteY2" fmla="*/ 320040 h 1094334"/>
-                <a:gd name="connsiteX3" fmla="*/ 0 w 932436"/>
-                <a:gd name="connsiteY3" fmla="*/ 0 h 1094334"/>
-              </a:gdLst>
-              <a:ahLst/>
-              <a:cxnLst>
-                <a:cxn ang="0">
-                  <a:pos x="connsiteX0" y="connsiteY0"/>
-                </a:cxn>
-                <a:cxn ang="0">
-                  <a:pos x="connsiteX1" y="connsiteY1"/>
-                </a:cxn>
-                <a:cxn ang="0">
-                  <a:pos x="connsiteX2" y="connsiteY2"/>
-                </a:cxn>
-                <a:cxn ang="0">
-                  <a:pos x="connsiteX3" y="connsiteY3"/>
-                </a:cxn>
-              </a:cxnLst>
-              <a:rect l="l" t="t" r="r" b="b"/>
-              <a:pathLst>
-                <a:path w="932436" h="1094334">
-                  <a:moveTo>
-                    <a:pt x="520247" y="1094334"/>
-                  </a:moveTo>
-                  <a:cubicBezTo>
-                    <a:pt x="772977" y="1001624"/>
-                    <a:pt x="984008" y="891049"/>
-                    <a:pt x="921279" y="762000"/>
-                  </a:cubicBezTo>
-                  <a:cubicBezTo>
-                    <a:pt x="858550" y="632951"/>
-                    <a:pt x="297421" y="447040"/>
-                    <a:pt x="143875" y="320040"/>
-                  </a:cubicBezTo>
-                  <a:cubicBezTo>
-                    <a:pt x="-9671" y="193040"/>
-                    <a:pt x="2633" y="145968"/>
-                    <a:pt x="0" y="0"/>
-                  </a:cubicBezTo>
-                </a:path>
-              </a:pathLst>
-            </a:custGeom>
-            <a:noFill/>
-            <a:ln>
-              <a:solidFill>
-                <a:schemeClr val="bg1"/>
-              </a:solidFill>
-            </a:ln>
-          </p:spPr>
-          <p:style>
-            <a:lnRef idx="2">
-              <a:schemeClr val="accent1">
-                <a:shade val="50000"/>
-              </a:schemeClr>
-            </a:lnRef>
-            <a:fillRef idx="1">
-              <a:schemeClr val="accent1"/>
-            </a:fillRef>
-            <a:effectRef idx="0">
-              <a:schemeClr val="accent1"/>
-            </a:effectRef>
-            <a:fontRef idx="minor">
-              <a:schemeClr val="lt1"/>
-            </a:fontRef>
-          </p:style>
-          <p:txBody>
-            <a:bodyPr rot="0" spcFirstLastPara="0" vert="horz" wrap="square" lIns="91440" tIns="45720" rIns="91440" bIns="45720" numCol="1" spcCol="0" rtlCol="0" fromWordArt="0" anchor="ctr" anchorCtr="0" forceAA="0" compatLnSpc="1">
-              <a:prstTxWarp prst="textNoShape">
-                <a:avLst/>
-              </a:prstTxWarp>
-              <a:noAutofit/>
-            </a:bodyPr>
-            <a:lstStyle/>
-            <a:p>
-              <a:endParaRPr lang="en-US"/>
-            </a:p>
-          </p:txBody>
-        </p:sp>
-        <p:pic>
-          <p:nvPicPr>
-            <p:cNvPr id="478" name="Picture 477" descr="http://w3.rcnuwc.no/public/physics/test/ict%20website-2-/Images/Dataloggers%20images/Pasco750.jpg" hidden="1"/>
-            <p:cNvPicPr/>
-            <p:nvPr/>
-          </p:nvPicPr>
-          <p:blipFill rotWithShape="1">
-            <a:blip r:embed="rId13">
-              <a:extLst>
-                <a:ext uri="{28A0092B-C50C-407E-A947-70E740481C1C}">
-                  <a14:useLocalDpi xmlns:a14="http://schemas.microsoft.com/office/drawing/2010/main" val="0"/>
-                </a:ext>
-              </a:extLst>
-            </a:blip>
-            <a:srcRect l="1200" t="2631" r="2000" b="4211"/>
-            <a:stretch/>
-          </p:blipFill>
-          <p:spPr bwMode="auto">
-            <a:xfrm>
-              <a:off x="3967597" y="6586220"/>
-              <a:ext cx="2499995" cy="914400"/>
-            </a:xfrm>
-            <a:prstGeom prst="rect">
-              <a:avLst/>
-            </a:prstGeom>
-            <a:noFill/>
-            <a:ln>
-              <a:noFill/>
-            </a:ln>
-            <a:extLst>
-              <a:ext uri="{53640926-AAD7-44D8-BBD7-CCE9431645EC}">
-                <a14:shadowObscured xmlns:a14="http://schemas.microsoft.com/office/drawing/2010/main"/>
-              </a:ext>
-            </a:extLst>
-          </p:spPr>
-        </p:pic>
-        <p:sp>
-          <p:nvSpPr>
-            <p:cNvPr id="479" name="Donut 478"/>
-            <p:cNvSpPr/>
-            <p:nvPr/>
-          </p:nvSpPr>
-          <p:spPr>
-            <a:xfrm>
-              <a:off x="4424797" y="7585075"/>
-              <a:ext cx="2377440" cy="2377440"/>
-            </a:xfrm>
-            <a:prstGeom prst="donut">
-              <a:avLst>
-                <a:gd name="adj" fmla="val 8620"/>
-              </a:avLst>
-            </a:prstGeom>
-            <a:solidFill>
-              <a:schemeClr val="bg1">
-                <a:lumMod val="50000"/>
-              </a:schemeClr>
-            </a:solidFill>
-            <a:ln>
-              <a:noFill/>
-            </a:ln>
-            <a:scene3d>
-              <a:camera prst="isometricOffAxis1Top"/>
-              <a:lightRig rig="threePt" dir="t"/>
-            </a:scene3d>
-            <a:sp3d>
-              <a:bevelT w="38100" h="127000"/>
-              <a:bevelB w="38100" h="127000"/>
-            </a:sp3d>
-          </p:spPr>
-          <p:style>
-            <a:lnRef idx="2">
-              <a:schemeClr val="accent1">
-                <a:shade val="50000"/>
-              </a:schemeClr>
-            </a:lnRef>
-            <a:fillRef idx="1">
-              <a:schemeClr val="accent1"/>
-            </a:fillRef>
-            <a:effectRef idx="0">
-              <a:schemeClr val="accent1"/>
-            </a:effectRef>
-            <a:fontRef idx="minor">
-              <a:schemeClr val="lt1"/>
-            </a:fontRef>
-          </p:style>
-          <p:txBody>
-            <a:bodyPr rot="0" spcFirstLastPara="0" vert="horz" wrap="square" lIns="91440" tIns="45720" rIns="91440" bIns="45720" numCol="1" spcCol="0" rtlCol="0" fromWordArt="0" anchor="ctr" anchorCtr="0" forceAA="0" compatLnSpc="1">
-              <a:prstTxWarp prst="textNoShape">
-                <a:avLst/>
-              </a:prstTxWarp>
-              <a:noAutofit/>
-            </a:bodyPr>
-            <a:lstStyle/>
-            <a:p>
-              <a:endParaRPr lang="en-US"/>
-            </a:p>
-          </p:txBody>
-        </p:sp>
-        <p:sp>
-          <p:nvSpPr>
-            <p:cNvPr id="480" name="Oval 479"/>
-            <p:cNvSpPr/>
-            <p:nvPr/>
-          </p:nvSpPr>
-          <p:spPr>
-            <a:xfrm>
-              <a:off x="5201402" y="7988935"/>
-              <a:ext cx="152400" cy="140970"/>
-            </a:xfrm>
-            <a:prstGeom prst="ellipse">
-              <a:avLst/>
-            </a:prstGeom>
-            <a:solidFill>
-              <a:schemeClr val="tx1">
-                <a:lumMod val="65000"/>
-                <a:lumOff val="35000"/>
-              </a:schemeClr>
-            </a:solidFill>
-            <a:ln>
-              <a:noFill/>
-            </a:ln>
-            <a:scene3d>
-              <a:camera prst="perspectiveBelow"/>
-              <a:lightRig rig="threePt" dir="t">
-                <a:rot lat="0" lon="0" rev="9600000"/>
-              </a:lightRig>
-            </a:scene3d>
-            <a:sp3d extrusionH="711200">
-              <a:bevelT w="44450" h="254000"/>
-              <a:bevelB w="0" h="0"/>
-            </a:sp3d>
-          </p:spPr>
-          <p:style>
-            <a:lnRef idx="2">
-              <a:schemeClr val="accent1">
-                <a:shade val="50000"/>
-              </a:schemeClr>
-            </a:lnRef>
-            <a:fillRef idx="1">
-              <a:schemeClr val="accent1"/>
-            </a:fillRef>
-            <a:effectRef idx="0">
-              <a:schemeClr val="accent1"/>
-            </a:effectRef>
-            <a:fontRef idx="minor">
-              <a:schemeClr val="lt1"/>
-            </a:fontRef>
-          </p:style>
-          <p:txBody>
-            <a:bodyPr rot="0" spcFirstLastPara="0" vert="horz" wrap="square" lIns="91440" tIns="45720" rIns="91440" bIns="45720" numCol="1" spcCol="0" rtlCol="0" fromWordArt="0" anchor="ctr" anchorCtr="0" forceAA="0" compatLnSpc="1">
-              <a:prstTxWarp prst="textNoShape">
-                <a:avLst/>
-              </a:prstTxWarp>
-              <a:noAutofit/>
-            </a:bodyPr>
-            <a:lstStyle/>
-            <a:p>
-              <a:endParaRPr lang="en-US"/>
-            </a:p>
-          </p:txBody>
-        </p:sp>
         <p:cxnSp>
           <p:nvCxnSpPr>
             <p:cNvPr id="481" name="Straight Arrow Connector 480"/>
@@ -18362,527 +17996,6 @@
             </a:fontRef>
           </p:style>
         </p:cxnSp>
-        <p:sp>
-          <p:nvSpPr>
-            <p:cNvPr id="484" name="Freeform 483"/>
-            <p:cNvSpPr/>
-            <p:nvPr/>
-          </p:nvSpPr>
-          <p:spPr>
-            <a:xfrm>
-              <a:off x="4912477" y="8064500"/>
-              <a:ext cx="452755" cy="565150"/>
-            </a:xfrm>
-            <a:custGeom>
-              <a:avLst/>
-              <a:gdLst>
-                <a:gd name="connsiteX0" fmla="*/ 397344 w 397344"/>
-                <a:gd name="connsiteY0" fmla="*/ 459658 h 459658"/>
-                <a:gd name="connsiteX1" fmla="*/ 1596 w 397344"/>
-                <a:gd name="connsiteY1" fmla="*/ 326922 h 459658"/>
-                <a:gd name="connsiteX2" fmla="*/ 259692 w 397344"/>
-                <a:gd name="connsiteY2" fmla="*/ 140109 h 459658"/>
-                <a:gd name="connsiteX3" fmla="*/ 301479 w 397344"/>
-                <a:gd name="connsiteY3" fmla="*/ 0 h 459658"/>
-                <a:gd name="connsiteX0" fmla="*/ 398276 w 398276"/>
-                <a:gd name="connsiteY0" fmla="*/ 459658 h 459658"/>
-                <a:gd name="connsiteX1" fmla="*/ 2528 w 398276"/>
-                <a:gd name="connsiteY1" fmla="*/ 326922 h 459658"/>
-                <a:gd name="connsiteX2" fmla="*/ 232263 w 398276"/>
-                <a:gd name="connsiteY2" fmla="*/ 147492 h 459658"/>
-                <a:gd name="connsiteX3" fmla="*/ 302411 w 398276"/>
-                <a:gd name="connsiteY3" fmla="*/ 0 h 459658"/>
-                <a:gd name="connsiteX0" fmla="*/ 398276 w 398276"/>
-                <a:gd name="connsiteY0" fmla="*/ 459658 h 459658"/>
-                <a:gd name="connsiteX1" fmla="*/ 2528 w 398276"/>
-                <a:gd name="connsiteY1" fmla="*/ 326922 h 459658"/>
-                <a:gd name="connsiteX2" fmla="*/ 232263 w 398276"/>
-                <a:gd name="connsiteY2" fmla="*/ 147492 h 459658"/>
-                <a:gd name="connsiteX3" fmla="*/ 302411 w 398276"/>
-                <a:gd name="connsiteY3" fmla="*/ 0 h 459658"/>
-                <a:gd name="connsiteX0" fmla="*/ 398151 w 398151"/>
-                <a:gd name="connsiteY0" fmla="*/ 459658 h 459658"/>
-                <a:gd name="connsiteX1" fmla="*/ 2403 w 398151"/>
-                <a:gd name="connsiteY1" fmla="*/ 326922 h 459658"/>
-                <a:gd name="connsiteX2" fmla="*/ 232138 w 398151"/>
-                <a:gd name="connsiteY2" fmla="*/ 147492 h 459658"/>
-                <a:gd name="connsiteX3" fmla="*/ 302286 w 398151"/>
-                <a:gd name="connsiteY3" fmla="*/ 0 h 459658"/>
-                <a:gd name="connsiteX0" fmla="*/ 381198 w 381197"/>
-                <a:gd name="connsiteY0" fmla="*/ 423897 h 423897"/>
-                <a:gd name="connsiteX1" fmla="*/ 1987 w 381197"/>
-                <a:gd name="connsiteY1" fmla="*/ 326922 h 423897"/>
-                <a:gd name="connsiteX2" fmla="*/ 231722 w 381197"/>
-                <a:gd name="connsiteY2" fmla="*/ 147492 h 423897"/>
-                <a:gd name="connsiteX3" fmla="*/ 301870 w 381197"/>
-                <a:gd name="connsiteY3" fmla="*/ 0 h 423897"/>
-                <a:gd name="connsiteX0" fmla="*/ 381198 w 381198"/>
-                <a:gd name="connsiteY0" fmla="*/ 423897 h 430233"/>
-                <a:gd name="connsiteX1" fmla="*/ 1987 w 381198"/>
-                <a:gd name="connsiteY1" fmla="*/ 326922 h 430233"/>
-                <a:gd name="connsiteX2" fmla="*/ 231722 w 381198"/>
-                <a:gd name="connsiteY2" fmla="*/ 147492 h 430233"/>
-                <a:gd name="connsiteX3" fmla="*/ 301870 w 381198"/>
-                <a:gd name="connsiteY3" fmla="*/ 0 h 430233"/>
-                <a:gd name="connsiteX0" fmla="*/ 438115 w 438115"/>
-                <a:gd name="connsiteY0" fmla="*/ 423897 h 433380"/>
-                <a:gd name="connsiteX1" fmla="*/ 1724 w 438115"/>
-                <a:gd name="connsiteY1" fmla="*/ 362775 h 433380"/>
-                <a:gd name="connsiteX2" fmla="*/ 288639 w 438115"/>
-                <a:gd name="connsiteY2" fmla="*/ 147492 h 433380"/>
-                <a:gd name="connsiteX3" fmla="*/ 358787 w 438115"/>
-                <a:gd name="connsiteY3" fmla="*/ 0 h 433380"/>
-                <a:gd name="connsiteX0" fmla="*/ 438794 w 438794"/>
-                <a:gd name="connsiteY0" fmla="*/ 423897 h 427754"/>
-                <a:gd name="connsiteX1" fmla="*/ 167596 w 438794"/>
-                <a:gd name="connsiteY1" fmla="*/ 423024 h 427754"/>
-                <a:gd name="connsiteX2" fmla="*/ 2403 w 438794"/>
-                <a:gd name="connsiteY2" fmla="*/ 362775 h 427754"/>
-                <a:gd name="connsiteX3" fmla="*/ 289318 w 438794"/>
-                <a:gd name="connsiteY3" fmla="*/ 147492 h 427754"/>
-                <a:gd name="connsiteX4" fmla="*/ 359466 w 438794"/>
-                <a:gd name="connsiteY4" fmla="*/ 0 h 427754"/>
-                <a:gd name="connsiteX0" fmla="*/ 441585 w 441585"/>
-                <a:gd name="connsiteY0" fmla="*/ 423897 h 566945"/>
-                <a:gd name="connsiteX1" fmla="*/ 132231 w 441585"/>
-                <a:gd name="connsiteY1" fmla="*/ 566458 h 566945"/>
-                <a:gd name="connsiteX2" fmla="*/ 5194 w 441585"/>
-                <a:gd name="connsiteY2" fmla="*/ 362775 h 566945"/>
-                <a:gd name="connsiteX3" fmla="*/ 292109 w 441585"/>
-                <a:gd name="connsiteY3" fmla="*/ 147492 h 566945"/>
-                <a:gd name="connsiteX4" fmla="*/ 362257 w 441585"/>
-                <a:gd name="connsiteY4" fmla="*/ 0 h 566945"/>
-                <a:gd name="connsiteX0" fmla="*/ 441585 w 441585"/>
-                <a:gd name="connsiteY0" fmla="*/ 423897 h 568123"/>
-                <a:gd name="connsiteX1" fmla="*/ 132231 w 441585"/>
-                <a:gd name="connsiteY1" fmla="*/ 566458 h 568123"/>
-                <a:gd name="connsiteX2" fmla="*/ 5194 w 441585"/>
-                <a:gd name="connsiteY2" fmla="*/ 362775 h 568123"/>
-                <a:gd name="connsiteX3" fmla="*/ 292109 w 441585"/>
-                <a:gd name="connsiteY3" fmla="*/ 147492 h 568123"/>
-                <a:gd name="connsiteX4" fmla="*/ 362257 w 441585"/>
-                <a:gd name="connsiteY4" fmla="*/ 0 h 568123"/>
-                <a:gd name="connsiteX0" fmla="*/ 453515 w 453515"/>
-                <a:gd name="connsiteY0" fmla="*/ 368902 h 567726"/>
-                <a:gd name="connsiteX1" fmla="*/ 132231 w 453515"/>
-                <a:gd name="connsiteY1" fmla="*/ 566458 h 567726"/>
-                <a:gd name="connsiteX2" fmla="*/ 5194 w 453515"/>
-                <a:gd name="connsiteY2" fmla="*/ 362775 h 567726"/>
-                <a:gd name="connsiteX3" fmla="*/ 292109 w 453515"/>
-                <a:gd name="connsiteY3" fmla="*/ 147492 h 567726"/>
-                <a:gd name="connsiteX4" fmla="*/ 362257 w 453515"/>
-                <a:gd name="connsiteY4" fmla="*/ 0 h 567726"/>
-              </a:gdLst>
-              <a:ahLst/>
-              <a:cxnLst>
-                <a:cxn ang="0">
-                  <a:pos x="connsiteX0" y="connsiteY0"/>
-                </a:cxn>
-                <a:cxn ang="0">
-                  <a:pos x="connsiteX1" y="connsiteY1"/>
-                </a:cxn>
-                <a:cxn ang="0">
-                  <a:pos x="connsiteX2" y="connsiteY2"/>
-                </a:cxn>
-                <a:cxn ang="0">
-                  <a:pos x="connsiteX3" y="connsiteY3"/>
-                </a:cxn>
-                <a:cxn ang="0">
-                  <a:pos x="connsiteX4" y="connsiteY4"/>
-                </a:cxn>
-              </a:cxnLst>
-              <a:rect l="l" t="t" r="r" b="b"/>
-              <a:pathLst>
-                <a:path w="453515" h="567726">
-                  <a:moveTo>
-                    <a:pt x="453515" y="368902"/>
-                  </a:moveTo>
-                  <a:cubicBezTo>
-                    <a:pt x="408315" y="368757"/>
-                    <a:pt x="271774" y="586211"/>
-                    <a:pt x="132231" y="566458"/>
-                  </a:cubicBezTo>
-                  <a:cubicBezTo>
-                    <a:pt x="59499" y="556271"/>
-                    <a:pt x="-21452" y="432602"/>
-                    <a:pt x="5194" y="362775"/>
-                  </a:cubicBezTo>
-                  <a:cubicBezTo>
-                    <a:pt x="31840" y="292948"/>
-                    <a:pt x="232598" y="207955"/>
-                    <a:pt x="292109" y="147492"/>
-                  </a:cubicBezTo>
-                  <a:cubicBezTo>
-                    <a:pt x="351620" y="87029"/>
-                    <a:pt x="358975" y="101876"/>
-                    <a:pt x="362257" y="0"/>
-                  </a:cubicBezTo>
-                </a:path>
-              </a:pathLst>
-            </a:custGeom>
-            <a:noFill/>
-            <a:ln>
-              <a:solidFill>
-                <a:schemeClr val="bg1"/>
-              </a:solidFill>
-            </a:ln>
-          </p:spPr>
-          <p:style>
-            <a:lnRef idx="2">
-              <a:schemeClr val="accent1">
-                <a:shade val="50000"/>
-              </a:schemeClr>
-            </a:lnRef>
-            <a:fillRef idx="1">
-              <a:schemeClr val="accent1"/>
-            </a:fillRef>
-            <a:effectRef idx="0">
-              <a:schemeClr val="accent1"/>
-            </a:effectRef>
-            <a:fontRef idx="minor">
-              <a:schemeClr val="lt1"/>
-            </a:fontRef>
-          </p:style>
-          <p:txBody>
-            <a:bodyPr rot="0" spcFirstLastPara="0" vert="horz" wrap="square" lIns="91440" tIns="45720" rIns="91440" bIns="45720" numCol="1" spcCol="0" rtlCol="0" fromWordArt="0" anchor="ctr" anchorCtr="0" forceAA="0" compatLnSpc="1">
-              <a:prstTxWarp prst="textNoShape">
-                <a:avLst/>
-              </a:prstTxWarp>
-              <a:noAutofit/>
-            </a:bodyPr>
-            <a:lstStyle/>
-            <a:p>
-              <a:endParaRPr lang="en-US"/>
-            </a:p>
-          </p:txBody>
-        </p:sp>
-        <p:sp>
-          <p:nvSpPr>
-            <p:cNvPr id="485" name="Freeform 484"/>
-            <p:cNvSpPr/>
-            <p:nvPr/>
-          </p:nvSpPr>
-          <p:spPr>
-            <a:xfrm>
-              <a:off x="5040747" y="8064500"/>
-              <a:ext cx="350520" cy="444500"/>
-            </a:xfrm>
-            <a:custGeom>
-              <a:avLst/>
-              <a:gdLst>
-                <a:gd name="connsiteX0" fmla="*/ 397344 w 397344"/>
-                <a:gd name="connsiteY0" fmla="*/ 459658 h 459658"/>
-                <a:gd name="connsiteX1" fmla="*/ 1596 w 397344"/>
-                <a:gd name="connsiteY1" fmla="*/ 326922 h 459658"/>
-                <a:gd name="connsiteX2" fmla="*/ 259692 w 397344"/>
-                <a:gd name="connsiteY2" fmla="*/ 140109 h 459658"/>
-                <a:gd name="connsiteX3" fmla="*/ 301479 w 397344"/>
-                <a:gd name="connsiteY3" fmla="*/ 0 h 459658"/>
-                <a:gd name="connsiteX0" fmla="*/ 292409 w 292409"/>
-                <a:gd name="connsiteY0" fmla="*/ 459658 h 459658"/>
-                <a:gd name="connsiteX1" fmla="*/ 2482 w 292409"/>
-                <a:gd name="connsiteY1" fmla="*/ 326922 h 459658"/>
-                <a:gd name="connsiteX2" fmla="*/ 154757 w 292409"/>
-                <a:gd name="connsiteY2" fmla="*/ 140109 h 459658"/>
-                <a:gd name="connsiteX3" fmla="*/ 196544 w 292409"/>
-                <a:gd name="connsiteY3" fmla="*/ 0 h 459658"/>
-                <a:gd name="connsiteX0" fmla="*/ 292409 w 292409"/>
-                <a:gd name="connsiteY0" fmla="*/ 442430 h 442430"/>
-                <a:gd name="connsiteX1" fmla="*/ 2482 w 292409"/>
-                <a:gd name="connsiteY1" fmla="*/ 326922 h 442430"/>
-                <a:gd name="connsiteX2" fmla="*/ 154757 w 292409"/>
-                <a:gd name="connsiteY2" fmla="*/ 140109 h 442430"/>
-                <a:gd name="connsiteX3" fmla="*/ 196544 w 292409"/>
-                <a:gd name="connsiteY3" fmla="*/ 0 h 442430"/>
-                <a:gd name="connsiteX0" fmla="*/ 292409 w 292409"/>
-                <a:gd name="connsiteY0" fmla="*/ 442430 h 442430"/>
-                <a:gd name="connsiteX1" fmla="*/ 2482 w 292409"/>
-                <a:gd name="connsiteY1" fmla="*/ 326922 h 442430"/>
-                <a:gd name="connsiteX2" fmla="*/ 154757 w 292409"/>
-                <a:gd name="connsiteY2" fmla="*/ 140109 h 442430"/>
-                <a:gd name="connsiteX3" fmla="*/ 196544 w 292409"/>
-                <a:gd name="connsiteY3" fmla="*/ 0 h 442430"/>
-                <a:gd name="connsiteX0" fmla="*/ 292524 w 292524"/>
-                <a:gd name="connsiteY0" fmla="*/ 442430 h 442430"/>
-                <a:gd name="connsiteX1" fmla="*/ 2597 w 292524"/>
-                <a:gd name="connsiteY1" fmla="*/ 326922 h 442430"/>
-                <a:gd name="connsiteX2" fmla="*/ 154872 w 292524"/>
-                <a:gd name="connsiteY2" fmla="*/ 140109 h 442430"/>
-                <a:gd name="connsiteX3" fmla="*/ 196659 w 292524"/>
-                <a:gd name="connsiteY3" fmla="*/ 0 h 442430"/>
-                <a:gd name="connsiteX0" fmla="*/ 294180 w 294180"/>
-                <a:gd name="connsiteY0" fmla="*/ 442430 h 442430"/>
-                <a:gd name="connsiteX1" fmla="*/ 4253 w 294180"/>
-                <a:gd name="connsiteY1" fmla="*/ 326922 h 442430"/>
-                <a:gd name="connsiteX2" fmla="*/ 129451 w 294180"/>
-                <a:gd name="connsiteY2" fmla="*/ 201626 h 442430"/>
-                <a:gd name="connsiteX3" fmla="*/ 198315 w 294180"/>
-                <a:gd name="connsiteY3" fmla="*/ 0 h 442430"/>
-                <a:gd name="connsiteX0" fmla="*/ 294180 w 294180"/>
-                <a:gd name="connsiteY0" fmla="*/ 393217 h 393217"/>
-                <a:gd name="connsiteX1" fmla="*/ 4253 w 294180"/>
-                <a:gd name="connsiteY1" fmla="*/ 326922 h 393217"/>
-                <a:gd name="connsiteX2" fmla="*/ 129451 w 294180"/>
-                <a:gd name="connsiteY2" fmla="*/ 201626 h 393217"/>
-                <a:gd name="connsiteX3" fmla="*/ 198315 w 294180"/>
-                <a:gd name="connsiteY3" fmla="*/ 0 h 393217"/>
-                <a:gd name="connsiteX0" fmla="*/ 294180 w 294180"/>
-                <a:gd name="connsiteY0" fmla="*/ 340725 h 340725"/>
-                <a:gd name="connsiteX1" fmla="*/ 4253 w 294180"/>
-                <a:gd name="connsiteY1" fmla="*/ 326922 h 340725"/>
-                <a:gd name="connsiteX2" fmla="*/ 129451 w 294180"/>
-                <a:gd name="connsiteY2" fmla="*/ 201626 h 340725"/>
-                <a:gd name="connsiteX3" fmla="*/ 198315 w 294180"/>
-                <a:gd name="connsiteY3" fmla="*/ 0 h 340725"/>
-                <a:gd name="connsiteX0" fmla="*/ 243261 w 243261"/>
-                <a:gd name="connsiteY0" fmla="*/ 340725 h 340725"/>
-                <a:gd name="connsiteX1" fmla="*/ 5866 w 243261"/>
-                <a:gd name="connsiteY1" fmla="*/ 286397 h 340725"/>
-                <a:gd name="connsiteX2" fmla="*/ 78532 w 243261"/>
-                <a:gd name="connsiteY2" fmla="*/ 201626 h 340725"/>
-                <a:gd name="connsiteX3" fmla="*/ 147396 w 243261"/>
-                <a:gd name="connsiteY3" fmla="*/ 0 h 340725"/>
-                <a:gd name="connsiteX0" fmla="*/ 237844 w 237844"/>
-                <a:gd name="connsiteY0" fmla="*/ 340725 h 340725"/>
-                <a:gd name="connsiteX1" fmla="*/ 449 w 237844"/>
-                <a:gd name="connsiteY1" fmla="*/ 286397 h 340725"/>
-                <a:gd name="connsiteX2" fmla="*/ 73115 w 237844"/>
-                <a:gd name="connsiteY2" fmla="*/ 201626 h 340725"/>
-                <a:gd name="connsiteX3" fmla="*/ 141979 w 237844"/>
-                <a:gd name="connsiteY3" fmla="*/ 0 h 340725"/>
-                <a:gd name="connsiteX0" fmla="*/ 240703 w 240703"/>
-                <a:gd name="connsiteY0" fmla="*/ 340725 h 340725"/>
-                <a:gd name="connsiteX1" fmla="*/ 3308 w 240703"/>
-                <a:gd name="connsiteY1" fmla="*/ 286397 h 340725"/>
-                <a:gd name="connsiteX2" fmla="*/ 104668 w 240703"/>
-                <a:gd name="connsiteY2" fmla="*/ 211161 h 340725"/>
-                <a:gd name="connsiteX3" fmla="*/ 144838 w 240703"/>
-                <a:gd name="connsiteY3" fmla="*/ 0 h 340725"/>
-                <a:gd name="connsiteX0" fmla="*/ 240640 w 240640"/>
-                <a:gd name="connsiteY0" fmla="*/ 340725 h 340725"/>
-                <a:gd name="connsiteX1" fmla="*/ 3245 w 240640"/>
-                <a:gd name="connsiteY1" fmla="*/ 286397 h 340725"/>
-                <a:gd name="connsiteX2" fmla="*/ 104605 w 240640"/>
-                <a:gd name="connsiteY2" fmla="*/ 211161 h 340725"/>
-                <a:gd name="connsiteX3" fmla="*/ 144775 w 240640"/>
-                <a:gd name="connsiteY3" fmla="*/ 0 h 340725"/>
-                <a:gd name="connsiteX0" fmla="*/ 241530 w 241530"/>
-                <a:gd name="connsiteY0" fmla="*/ 340725 h 340725"/>
-                <a:gd name="connsiteX1" fmla="*/ 4135 w 241530"/>
-                <a:gd name="connsiteY1" fmla="*/ 286397 h 340725"/>
-                <a:gd name="connsiteX2" fmla="*/ 93527 w 241530"/>
-                <a:gd name="connsiteY2" fmla="*/ 192091 h 340725"/>
-                <a:gd name="connsiteX3" fmla="*/ 145665 w 241530"/>
-                <a:gd name="connsiteY3" fmla="*/ 0 h 340725"/>
-                <a:gd name="connsiteX0" fmla="*/ 240642 w 240642"/>
-                <a:gd name="connsiteY0" fmla="*/ 340725 h 340725"/>
-                <a:gd name="connsiteX1" fmla="*/ 3247 w 240642"/>
-                <a:gd name="connsiteY1" fmla="*/ 286397 h 340725"/>
-                <a:gd name="connsiteX2" fmla="*/ 104588 w 240642"/>
-                <a:gd name="connsiteY2" fmla="*/ 192091 h 340725"/>
-                <a:gd name="connsiteX3" fmla="*/ 144777 w 240642"/>
-                <a:gd name="connsiteY3" fmla="*/ 0 h 340725"/>
-                <a:gd name="connsiteX0" fmla="*/ 187788 w 187788"/>
-                <a:gd name="connsiteY0" fmla="*/ 340725 h 340725"/>
-                <a:gd name="connsiteX1" fmla="*/ 5447 w 187788"/>
-                <a:gd name="connsiteY1" fmla="*/ 276862 h 340725"/>
-                <a:gd name="connsiteX2" fmla="*/ 51734 w 187788"/>
-                <a:gd name="connsiteY2" fmla="*/ 192091 h 340725"/>
-                <a:gd name="connsiteX3" fmla="*/ 91923 w 187788"/>
-                <a:gd name="connsiteY3" fmla="*/ 0 h 340725"/>
-                <a:gd name="connsiteX0" fmla="*/ 189001 w 189001"/>
-                <a:gd name="connsiteY0" fmla="*/ 340725 h 340725"/>
-                <a:gd name="connsiteX1" fmla="*/ 6660 w 189001"/>
-                <a:gd name="connsiteY1" fmla="*/ 276862 h 340725"/>
-                <a:gd name="connsiteX2" fmla="*/ 52947 w 189001"/>
-                <a:gd name="connsiteY2" fmla="*/ 192091 h 340725"/>
-                <a:gd name="connsiteX3" fmla="*/ 93136 w 189001"/>
-                <a:gd name="connsiteY3" fmla="*/ 0 h 340725"/>
-                <a:gd name="connsiteX0" fmla="*/ 351786 w 351786"/>
-                <a:gd name="connsiteY0" fmla="*/ 340725 h 425121"/>
-                <a:gd name="connsiteX1" fmla="*/ 1834 w 351786"/>
-                <a:gd name="connsiteY1" fmla="*/ 422273 h 425121"/>
-                <a:gd name="connsiteX2" fmla="*/ 215732 w 351786"/>
-                <a:gd name="connsiteY2" fmla="*/ 192091 h 425121"/>
-                <a:gd name="connsiteX3" fmla="*/ 255921 w 351786"/>
-                <a:gd name="connsiteY3" fmla="*/ 0 h 425121"/>
-                <a:gd name="connsiteX0" fmla="*/ 350691 w 350691"/>
-                <a:gd name="connsiteY0" fmla="*/ 340725 h 429001"/>
-                <a:gd name="connsiteX1" fmla="*/ 151855 w 350691"/>
-                <a:gd name="connsiteY1" fmla="*/ 365140 h 429001"/>
-                <a:gd name="connsiteX2" fmla="*/ 739 w 350691"/>
-                <a:gd name="connsiteY2" fmla="*/ 422273 h 429001"/>
-                <a:gd name="connsiteX3" fmla="*/ 214637 w 350691"/>
-                <a:gd name="connsiteY3" fmla="*/ 192091 h 429001"/>
-                <a:gd name="connsiteX4" fmla="*/ 254826 w 350691"/>
-                <a:gd name="connsiteY4" fmla="*/ 0 h 429001"/>
-                <a:gd name="connsiteX0" fmla="*/ 352297 w 352297"/>
-                <a:gd name="connsiteY0" fmla="*/ 340725 h 445802"/>
-                <a:gd name="connsiteX1" fmla="*/ 117595 w 352297"/>
-                <a:gd name="connsiteY1" fmla="*/ 429001 h 445802"/>
-                <a:gd name="connsiteX2" fmla="*/ 2345 w 352297"/>
-                <a:gd name="connsiteY2" fmla="*/ 422273 h 445802"/>
-                <a:gd name="connsiteX3" fmla="*/ 216243 w 352297"/>
-                <a:gd name="connsiteY3" fmla="*/ 192091 h 445802"/>
-                <a:gd name="connsiteX4" fmla="*/ 256432 w 352297"/>
-                <a:gd name="connsiteY4" fmla="*/ 0 h 445802"/>
-                <a:gd name="connsiteX0" fmla="*/ 352297 w 352297"/>
-                <a:gd name="connsiteY0" fmla="*/ 340725 h 445802"/>
-                <a:gd name="connsiteX1" fmla="*/ 117595 w 352297"/>
-                <a:gd name="connsiteY1" fmla="*/ 429001 h 445802"/>
-                <a:gd name="connsiteX2" fmla="*/ 2345 w 352297"/>
-                <a:gd name="connsiteY2" fmla="*/ 422273 h 445802"/>
-                <a:gd name="connsiteX3" fmla="*/ 216243 w 352297"/>
-                <a:gd name="connsiteY3" fmla="*/ 192091 h 445802"/>
-                <a:gd name="connsiteX4" fmla="*/ 256432 w 352297"/>
-                <a:gd name="connsiteY4" fmla="*/ 0 h 445802"/>
-              </a:gdLst>
-              <a:ahLst/>
-              <a:cxnLst>
-                <a:cxn ang="0">
-                  <a:pos x="connsiteX0" y="connsiteY0"/>
-                </a:cxn>
-                <a:cxn ang="0">
-                  <a:pos x="connsiteX1" y="connsiteY1"/>
-                </a:cxn>
-                <a:cxn ang="0">
-                  <a:pos x="connsiteX2" y="connsiteY2"/>
-                </a:cxn>
-                <a:cxn ang="0">
-                  <a:pos x="connsiteX3" y="connsiteY3"/>
-                </a:cxn>
-                <a:cxn ang="0">
-                  <a:pos x="connsiteX4" y="connsiteY4"/>
-                </a:cxn>
-              </a:cxnLst>
-              <a:rect l="l" t="t" r="r" b="b"/>
-              <a:pathLst>
-                <a:path w="352297" h="445802">
-                  <a:moveTo>
-                    <a:pt x="352297" y="340725"/>
-                  </a:moveTo>
-                  <a:cubicBezTo>
-                    <a:pt x="237784" y="337629"/>
-                    <a:pt x="175920" y="415410"/>
-                    <a:pt x="117595" y="429001"/>
-                  </a:cubicBezTo>
-                  <a:cubicBezTo>
-                    <a:pt x="59270" y="442592"/>
-                    <a:pt x="-14096" y="461758"/>
-                    <a:pt x="2345" y="422273"/>
-                  </a:cubicBezTo>
-                  <a:cubicBezTo>
-                    <a:pt x="18786" y="382788"/>
-                    <a:pt x="173895" y="262470"/>
-                    <a:pt x="216243" y="192091"/>
-                  </a:cubicBezTo>
-                  <a:cubicBezTo>
-                    <a:pt x="258591" y="121712"/>
-                    <a:pt x="260528" y="106789"/>
-                    <a:pt x="256432" y="0"/>
-                  </a:cubicBezTo>
-                </a:path>
-              </a:pathLst>
-            </a:custGeom>
-            <a:noFill/>
-            <a:ln>
-              <a:solidFill>
-                <a:schemeClr val="bg1"/>
-              </a:solidFill>
-            </a:ln>
-          </p:spPr>
-          <p:style>
-            <a:lnRef idx="2">
-              <a:schemeClr val="accent1">
-                <a:shade val="50000"/>
-              </a:schemeClr>
-            </a:lnRef>
-            <a:fillRef idx="1">
-              <a:schemeClr val="accent1"/>
-            </a:fillRef>
-            <a:effectRef idx="0">
-              <a:schemeClr val="accent1"/>
-            </a:effectRef>
-            <a:fontRef idx="minor">
-              <a:schemeClr val="lt1"/>
-            </a:fontRef>
-          </p:style>
-          <p:txBody>
-            <a:bodyPr rot="0" spcFirstLastPara="0" vert="horz" wrap="square" lIns="91440" tIns="45720" rIns="91440" bIns="45720" numCol="1" spcCol="0" rtlCol="0" fromWordArt="0" anchor="ctr" anchorCtr="0" forceAA="0" compatLnSpc="1">
-              <a:prstTxWarp prst="textNoShape">
-                <a:avLst/>
-              </a:prstTxWarp>
-              <a:noAutofit/>
-            </a:bodyPr>
-            <a:lstStyle/>
-            <a:p>
-              <a:endParaRPr lang="en-US"/>
-            </a:p>
-          </p:txBody>
-        </p:sp>
-        <p:sp>
-          <p:nvSpPr>
-            <p:cNvPr id="486" name="Donut 485"/>
-            <p:cNvSpPr/>
-            <p:nvPr/>
-          </p:nvSpPr>
-          <p:spPr>
-            <a:xfrm>
-              <a:off x="5327767" y="8072755"/>
-              <a:ext cx="571500" cy="571500"/>
-            </a:xfrm>
-            <a:prstGeom prst="donut">
-              <a:avLst>
-                <a:gd name="adj" fmla="val 41634"/>
-              </a:avLst>
-            </a:prstGeom>
-            <a:solidFill>
-              <a:schemeClr val="tx1">
-                <a:lumMod val="65000"/>
-                <a:lumOff val="35000"/>
-              </a:schemeClr>
-            </a:solidFill>
-            <a:ln>
-              <a:noFill/>
-            </a:ln>
-            <a:scene3d>
-              <a:camera prst="isometricOffAxis1Top"/>
-              <a:lightRig rig="threePt" dir="t"/>
-            </a:scene3d>
-            <a:sp3d>
-              <a:bevelT w="38100" h="254000"/>
-              <a:bevelB w="38100" h="254000"/>
-            </a:sp3d>
-          </p:spPr>
-          <p:style>
-            <a:lnRef idx="2">
-              <a:schemeClr val="accent1">
-                <a:shade val="50000"/>
-              </a:schemeClr>
-            </a:lnRef>
-            <a:fillRef idx="1">
-              <a:schemeClr val="accent1"/>
-            </a:fillRef>
-            <a:effectRef idx="0">
-              <a:schemeClr val="accent1"/>
-            </a:effectRef>
-            <a:fontRef idx="minor">
-              <a:schemeClr val="lt1"/>
-            </a:fontRef>
-          </p:style>
-          <p:txBody>
-            <a:bodyPr rot="0" spcFirstLastPara="0" vert="horz" wrap="square" lIns="91440" tIns="45720" rIns="91440" bIns="45720" numCol="1" spcCol="0" rtlCol="0" fromWordArt="0" anchor="ctr" anchorCtr="0" forceAA="0" compatLnSpc="1">
-              <a:prstTxWarp prst="textNoShape">
-                <a:avLst/>
-              </a:prstTxWarp>
-              <a:noAutofit/>
-            </a:bodyPr>
-            <a:lstStyle/>
-            <a:p>
-              <a:endParaRPr lang="en-US"/>
-            </a:p>
-          </p:txBody>
-        </p:sp>
       </p:grpSp>
       <p:grpSp>
         <p:nvGrpSpPr>
@@ -19972,8 +19085,8 @@
                 </p:style>
               </p:cxnSp>
             </p:grpSp>
-            <mc:AlternateContent xmlns:mc="http://schemas.openxmlformats.org/markup-compatibility/2006" xmlns:a14="http://schemas.microsoft.com/office/drawing/2010/main">
-              <mc:Choice Requires="a14">
+            <mc:AlternateContent xmlns:mc="http://schemas.openxmlformats.org/markup-compatibility/2006">
+              <mc:Choice xmlns:a14="http://schemas.microsoft.com/office/drawing/2010/main" Requires="a14">
                 <p:sp>
                   <p:nvSpPr>
                     <p:cNvPr id="582" name="Text Box 9"/>
@@ -20038,7 +19151,7 @@
                               <m:accPr>
                                 <m:chr m:val="⃗"/>
                                 <m:ctrlPr>
-                                  <a:rPr lang="en-US" sz="1000" i="1" smtClean="0">
+                                  <a:rPr lang="en-US" sz="1050" i="1" smtClean="0">
                                     <a:solidFill>
                                       <a:schemeClr val="bg1"/>
                                     </a:solidFill>
@@ -20051,7 +19164,7 @@
                               </m:accPr>
                               <m:e>
                                 <m:r>
-                                  <a:rPr lang="en-US" sz="1000" i="1">
+                                  <a:rPr lang="en-US" sz="1050" i="1">
                                     <a:solidFill>
                                       <a:schemeClr val="bg1"/>
                                     </a:solidFill>
@@ -20079,7 +19192,7 @@
                   </p:txBody>
                 </p:sp>
               </mc:Choice>
-              <mc:Fallback xmlns="">
+              <mc:Fallback>
                 <p:sp>
                   <p:nvSpPr>
                     <p:cNvPr id="582" name="Text Box 9"/>
@@ -20099,7 +19212,7 @@
                     <a:blipFill rotWithShape="1">
                       <a:blip r:embed="rId16"/>
                       <a:stretch>
-                        <a:fillRect/>
+                        <a:fillRect r="-5556"/>
                       </a:stretch>
                     </a:blipFill>
                     <a:ln w="6350">
@@ -20122,8 +19235,8 @@
                 </p:sp>
               </mc:Fallback>
             </mc:AlternateContent>
-            <mc:AlternateContent xmlns:mc="http://schemas.openxmlformats.org/markup-compatibility/2006" xmlns:a14="http://schemas.microsoft.com/office/drawing/2010/main">
-              <mc:Choice Requires="a14">
+            <mc:AlternateContent xmlns:mc="http://schemas.openxmlformats.org/markup-compatibility/2006">
+              <mc:Choice xmlns:a14="http://schemas.microsoft.com/office/drawing/2010/main" Requires="a14">
                 <p:sp>
                   <p:nvSpPr>
                     <p:cNvPr id="583" name="Text Box 10"/>
@@ -20185,7 +19298,7 @@
                           </m:oMathParaPr>
                           <m:oMath xmlns:m="http://schemas.openxmlformats.org/officeDocument/2006/math">
                             <m:r>
-                              <a:rPr lang="en-US" sz="800" i="1" smtClean="0">
+                              <a:rPr lang="en-US" sz="1050" i="1" smtClean="0">
                                 <a:solidFill>
                                   <a:schemeClr val="bg1"/>
                                 </a:solidFill>
@@ -20197,7 +19310,7 @@
                               <m:t>+</m:t>
                             </m:r>
                             <m:r>
-                              <a:rPr lang="en-US" sz="800" i="1" smtClean="0">
+                              <a:rPr lang="en-US" sz="1050" i="1" smtClean="0">
                                 <a:solidFill>
                                   <a:schemeClr val="bg1"/>
                                 </a:solidFill>
@@ -20211,7 +19324,7 @@
                           </m:oMath>
                         </m:oMathPara>
                       </a14:m>
-                      <a:endParaRPr lang="en-US" sz="800">
+                      <a:endParaRPr lang="en-US" sz="1050" dirty="0">
                         <a:solidFill>
                           <a:schemeClr val="bg1"/>
                         </a:solidFill>
@@ -20223,7 +19336,7 @@
                   </p:txBody>
                 </p:sp>
               </mc:Choice>
-              <mc:Fallback xmlns="">
+              <mc:Fallback>
                 <p:sp>
                   <p:nvSpPr>
                     <p:cNvPr id="583" name="Text Box 10"/>
@@ -20243,7 +19356,7 @@
                     <a:blipFill rotWithShape="1">
                       <a:blip r:embed="rId17"/>
                       <a:stretch>
-                        <a:fillRect/>
+                        <a:fillRect r="-14000"/>
                       </a:stretch>
                     </a:blipFill>
                     <a:ln w="6350">
@@ -20266,8 +19379,8 @@
                 </p:sp>
               </mc:Fallback>
             </mc:AlternateContent>
-            <mc:AlternateContent xmlns:mc="http://schemas.openxmlformats.org/markup-compatibility/2006" xmlns:a14="http://schemas.microsoft.com/office/drawing/2010/main">
-              <mc:Choice Requires="a14">
+            <mc:AlternateContent xmlns:mc="http://schemas.openxmlformats.org/markup-compatibility/2006">
+              <mc:Choice xmlns:a14="http://schemas.microsoft.com/office/drawing/2010/main" Requires="a14">
                 <p:sp>
                   <p:nvSpPr>
                     <p:cNvPr id="584" name="Text Box 11"/>
@@ -20329,7 +19442,7 @@
                           </m:oMathParaPr>
                           <m:oMath xmlns:m="http://schemas.openxmlformats.org/officeDocument/2006/math">
                             <m:r>
-                              <a:rPr lang="en-US" sz="800" i="1" smtClean="0">
+                              <a:rPr lang="en-US" sz="1050" i="1" smtClean="0">
                                 <a:solidFill>
                                   <a:schemeClr val="bg1"/>
                                 </a:solidFill>
@@ -20341,7 +19454,7 @@
                               <m:t>−</m:t>
                             </m:r>
                             <m:r>
-                              <a:rPr lang="en-US" sz="800" i="1" smtClean="0">
+                              <a:rPr lang="en-US" sz="1050" i="1" smtClean="0">
                                 <a:solidFill>
                                   <a:schemeClr val="bg1"/>
                                 </a:solidFill>
@@ -20355,7 +19468,7 @@
                           </m:oMath>
                         </m:oMathPara>
                       </a14:m>
-                      <a:endParaRPr lang="en-US" sz="800">
+                      <a:endParaRPr lang="en-US" sz="1050" dirty="0">
                         <a:solidFill>
                           <a:schemeClr val="bg1"/>
                         </a:solidFill>
@@ -20367,7 +19480,7 @@
                   </p:txBody>
                 </p:sp>
               </mc:Choice>
-              <mc:Fallback xmlns="">
+              <mc:Fallback>
                 <p:sp>
                   <p:nvSpPr>
                     <p:cNvPr id="584" name="Text Box 11"/>
@@ -20387,7 +19500,7 @@
                     <a:blipFill rotWithShape="1">
                       <a:blip r:embed="rId18"/>
                       <a:stretch>
-                        <a:fillRect/>
+                        <a:fillRect r="-14000"/>
                       </a:stretch>
                     </a:blipFill>
                     <a:ln w="6350">
@@ -20410,8 +19523,8 @@
                 </p:sp>
               </mc:Fallback>
             </mc:AlternateContent>
-            <mc:AlternateContent xmlns:mc="http://schemas.openxmlformats.org/markup-compatibility/2006" xmlns:a14="http://schemas.microsoft.com/office/drawing/2010/main">
-              <mc:Choice Requires="a14">
+            <mc:AlternateContent xmlns:mc="http://schemas.openxmlformats.org/markup-compatibility/2006">
+              <mc:Choice xmlns:a14="http://schemas.microsoft.com/office/drawing/2010/main" Requires="a14">
                 <p:sp>
                   <p:nvSpPr>
                     <p:cNvPr id="585" name="Text Box 12"/>
@@ -20420,7 +19533,7 @@
                   </p:nvSpPr>
                   <p:spPr>
                     <a:xfrm>
-                      <a:off x="281940" y="456111"/>
+                      <a:off x="281940" y="414746"/>
                       <a:ext cx="411480" cy="388621"/>
                     </a:xfrm>
                     <a:prstGeom prst="rect">
@@ -20473,7 +19586,7 @@
                           </m:oMathParaPr>
                           <m:oMath xmlns:m="http://schemas.openxmlformats.org/officeDocument/2006/math">
                             <m:r>
-                              <a:rPr lang="en-US" sz="1000" i="1" smtClean="0">
+                              <a:rPr lang="en-US" sz="1050" i="1" smtClean="0">
                                 <a:solidFill>
                                   <a:schemeClr val="bg1"/>
                                 </a:solidFill>
@@ -20499,7 +19612,7 @@
                   </p:txBody>
                 </p:sp>
               </mc:Choice>
-              <mc:Fallback xmlns="">
+              <mc:Fallback>
                 <p:sp>
                   <p:nvSpPr>
                     <p:cNvPr id="585" name="Text Box 12"/>
@@ -20510,7 +19623,7 @@
                   </p:nvSpPr>
                   <p:spPr>
                     <a:xfrm>
-                      <a:off x="281940" y="456111"/>
+                      <a:off x="281940" y="414746"/>
                       <a:ext cx="411480" cy="388621"/>
                     </a:xfrm>
                     <a:prstGeom prst="rect">
@@ -20550,7 +19663,7 @@
               </p:nvCxnSpPr>
               <p:spPr>
                 <a:xfrm>
-                  <a:off x="251460" y="754380"/>
+                  <a:off x="251460" y="733697"/>
                   <a:ext cx="441960" cy="0"/>
                 </a:xfrm>
                 <a:prstGeom prst="straightConnector1">
@@ -21614,8 +20727,8 @@
               </p:style>
             </p:cxnSp>
           </p:grpSp>
-          <mc:AlternateContent xmlns:mc="http://schemas.openxmlformats.org/markup-compatibility/2006" xmlns:a14="http://schemas.microsoft.com/office/drawing/2010/main">
-            <mc:Choice Requires="a14">
+          <mc:AlternateContent xmlns:mc="http://schemas.openxmlformats.org/markup-compatibility/2006">
+            <mc:Choice xmlns:a14="http://schemas.microsoft.com/office/drawing/2010/main" Requires="a14">
               <p:sp>
                 <p:nvSpPr>
                   <p:cNvPr id="577" name="Text Box 29"/>
@@ -21671,7 +20784,7 @@
                       </a:spcAft>
                     </a:pPr>
                     <a:r>
-                      <a:rPr lang="en-US" sz="900" dirty="0" smtClean="0">
+                      <a:rPr lang="en-US" sz="1050" dirty="0" smtClean="0">
                         <a:solidFill>
                           <a:schemeClr val="bg1"/>
                         </a:solidFill>
@@ -21685,7 +20798,7 @@
                     <a14:m>
                       <m:oMath xmlns:m="http://schemas.openxmlformats.org/officeDocument/2006/math">
                         <m:r>
-                          <a:rPr lang="en-US" sz="900" i="1">
+                          <a:rPr lang="en-US" sz="1050" i="1">
                             <a:solidFill>
                               <a:schemeClr val="bg1"/>
                             </a:solidFill>
@@ -21698,7 +20811,7 @@
                         </m:r>
                       </m:oMath>
                     </a14:m>
-                    <a:endParaRPr lang="en-US" sz="900" dirty="0">
+                    <a:endParaRPr lang="en-US" sz="1050" dirty="0">
                       <a:solidFill>
                         <a:schemeClr val="bg1"/>
                       </a:solidFill>
@@ -21710,7 +20823,7 @@
                 </p:txBody>
               </p:sp>
             </mc:Choice>
-            <mc:Fallback xmlns="">
+            <mc:Fallback>
               <p:sp>
                 <p:nvSpPr>
                   <p:cNvPr id="577" name="Text Box 29"/>
@@ -21730,7 +20843,7 @@
                   <a:blipFill rotWithShape="1">
                     <a:blip r:embed="rId22"/>
                     <a:stretch>
-                      <a:fillRect/>
+                      <a:fillRect b="-4255"/>
                     </a:stretch>
                   </a:blipFill>
                   <a:ln w="6350">
@@ -25141,60 +24254,6 @@
           </p:txBody>
         </p:sp>
       </p:grpSp>
-      <p:pic>
-        <p:nvPicPr>
-          <p:cNvPr id="1027" name="Picture 3"/>
-          <p:cNvPicPr>
-            <a:picLocks noChangeAspect="1" noChangeArrowheads="1"/>
-          </p:cNvPicPr>
-          <p:nvPr/>
-        </p:nvPicPr>
-        <p:blipFill>
-          <a:blip r:embed="rId31" cstate="print">
-            <a:extLst>
-              <a:ext uri="{28A0092B-C50C-407E-A947-70E740481C1C}">
-                <a14:useLocalDpi xmlns:a14="http://schemas.microsoft.com/office/drawing/2010/main" val="0"/>
-              </a:ext>
-            </a:extLst>
-          </a:blip>
-          <a:srcRect/>
-          <a:stretch>
-            <a:fillRect/>
-          </a:stretch>
-        </p:blipFill>
-        <p:spPr bwMode="auto">
-          <a:xfrm>
-            <a:off x="4842069" y="5636906"/>
-            <a:ext cx="1198210" cy="1189899"/>
-          </a:xfrm>
-          <a:prstGeom prst="rect">
-            <a:avLst/>
-          </a:prstGeom>
-          <a:noFill/>
-          <a:ln>
-            <a:noFill/>
-          </a:ln>
-          <a:extLst>
-            <a:ext uri="{909E8E84-426E-40DD-AFC4-6F175D3DCCD1}">
-              <a14:hiddenFill xmlns:a14="http://schemas.microsoft.com/office/drawing/2010/main">
-                <a:solidFill>
-                  <a:schemeClr val="accent1"/>
-                </a:solidFill>
-              </a14:hiddenFill>
-            </a:ext>
-            <a:ext uri="{91240B29-F687-4F45-9708-019B960494DF}">
-              <a14:hiddenLine xmlns:a14="http://schemas.microsoft.com/office/drawing/2010/main" w="9525">
-                <a:solidFill>
-                  <a:schemeClr val="tx1"/>
-                </a:solidFill>
-                <a:miter lim="800000"/>
-                <a:headEnd/>
-                <a:tailEnd/>
-              </a14:hiddenLine>
-            </a:ext>
-          </a:extLst>
-        </p:spPr>
-      </p:pic>
       <p:grpSp>
         <p:nvGrpSpPr>
           <p:cNvPr id="412" name="Charged Rod"/>
@@ -25203,10 +24262,10 @@
         </p:nvGrpSpPr>
         <p:grpSpPr>
           <a:xfrm>
-            <a:off x="587726" y="2112504"/>
-            <a:ext cx="2325150" cy="2305490"/>
-            <a:chOff x="0" y="0"/>
-            <a:chExt cx="2403480" cy="2383674"/>
+            <a:off x="576296" y="2112504"/>
+            <a:ext cx="2306100" cy="2305490"/>
+            <a:chOff x="-11814" y="0"/>
+            <a:chExt cx="2383790" cy="2383674"/>
           </a:xfrm>
         </p:grpSpPr>
         <p:sp>
@@ -25219,7 +24278,7 @@
           </p:nvSpPr>
           <p:spPr bwMode="auto">
             <a:xfrm>
-              <a:off x="1492808" y="1035932"/>
+              <a:off x="1492808" y="1000480"/>
               <a:ext cx="227915" cy="259714"/>
             </a:xfrm>
             <a:prstGeom prst="rect">
@@ -25249,7 +24308,7 @@
                 </a:spcAft>
               </a:pPr>
               <a:r>
-                <a:rPr lang="en-US" sz="800" i="1">
+                <a:rPr lang="en-US" sz="1000" i="1" dirty="0">
                   <a:solidFill>
                     <a:schemeClr val="bg1"/>
                   </a:solidFill>
@@ -25260,7 +24319,7 @@
                 </a:rPr>
                 <a:t>P</a:t>
               </a:r>
-              <a:endParaRPr lang="en-US" sz="1050">
+              <a:endParaRPr lang="en-US" sz="1200" dirty="0">
                 <a:solidFill>
                   <a:schemeClr val="bg1"/>
                 </a:solidFill>
@@ -25318,7 +24377,7 @@
             </a:bodyPr>
             <a:lstStyle/>
             <a:p>
-              <a:endParaRPr lang="en-US" sz="1800">
+              <a:endParaRPr lang="en-US" sz="2400">
                 <a:solidFill>
                   <a:schemeClr val="bg1"/>
                 </a:solidFill>
@@ -25373,7 +24432,7 @@
           </p:nvSpPr>
           <p:spPr bwMode="auto">
             <a:xfrm>
-              <a:off x="2175565" y="1174829"/>
+              <a:off x="2144061" y="1174829"/>
               <a:ext cx="227915" cy="259714"/>
             </a:xfrm>
             <a:prstGeom prst="rect">
@@ -25403,7 +24462,7 @@
                 </a:spcAft>
               </a:pPr>
               <a:r>
-                <a:rPr lang="en-US" sz="800" i="1">
+                <a:rPr lang="en-US" sz="1000" i="1" dirty="0">
                   <a:solidFill>
                     <a:schemeClr val="bg1"/>
                   </a:solidFill>
@@ -25414,7 +24473,7 @@
                 </a:rPr>
                 <a:t>x</a:t>
               </a:r>
-              <a:endParaRPr lang="en-US" sz="1050">
+              <a:endParaRPr lang="en-US" sz="1200" dirty="0">
                 <a:solidFill>
                   <a:schemeClr val="bg1"/>
                 </a:solidFill>
@@ -25513,7 +24572,7 @@
             </a:bodyPr>
             <a:lstStyle/>
             <a:p>
-              <a:endParaRPr lang="en-US" sz="1800">
+              <a:endParaRPr lang="en-US" sz="2400">
                 <a:solidFill>
                   <a:schemeClr val="bg1"/>
                 </a:solidFill>
@@ -25529,10 +24588,10 @@
           </p:nvGrpSpPr>
           <p:grpSpPr>
             <a:xfrm>
-              <a:off x="572822" y="405114"/>
-              <a:ext cx="547391" cy="265336"/>
-              <a:chOff x="0" y="0"/>
-              <a:chExt cx="547511" cy="265337"/>
+              <a:off x="572822" y="381480"/>
+              <a:ext cx="591147" cy="288970"/>
+              <a:chOff x="0" y="-23634"/>
+              <a:chExt cx="591277" cy="288971"/>
             </a:xfrm>
           </p:grpSpPr>
           <p:sp>
@@ -25545,8 +24604,8 @@
             </p:nvSpPr>
             <p:spPr bwMode="auto">
               <a:xfrm>
-                <a:off x="211667" y="0"/>
-                <a:ext cx="335844" cy="259419"/>
+                <a:off x="211666" y="-23634"/>
+                <a:ext cx="379611" cy="259419"/>
               </a:xfrm>
               <a:prstGeom prst="rect">
                 <a:avLst/>
@@ -25578,7 +24637,7 @@
                   </a:spcAft>
                 </a:pPr>
                 <a:r>
-                  <a:rPr lang="en-US" sz="800" i="1" dirty="0">
+                  <a:rPr lang="en-US" sz="1000" i="1" dirty="0">
                     <a:solidFill>
                       <a:schemeClr val="bg1"/>
                     </a:solidFill>
@@ -25589,7 +24648,7 @@
                   </a:rPr>
                   <a:t>dQ</a:t>
                 </a:r>
-                <a:endParaRPr lang="en-US" sz="1050" dirty="0">
+                <a:endParaRPr lang="en-US" sz="1200" dirty="0">
                   <a:solidFill>
                     <a:schemeClr val="bg1"/>
                   </a:solidFill>
@@ -25766,7 +24825,7 @@
             </a:bodyPr>
             <a:lstStyle/>
             <a:p>
-              <a:endParaRPr lang="en-US" sz="1800">
+              <a:endParaRPr lang="en-US" sz="2400">
                 <a:solidFill>
                   <a:schemeClr val="bg1"/>
                 </a:solidFill>
@@ -25896,7 +24955,7 @@
             </a:bodyPr>
             <a:lstStyle/>
             <a:p>
-              <a:endParaRPr lang="en-US" sz="1800">
+              <a:endParaRPr lang="en-US" sz="2400">
                 <a:solidFill>
                   <a:schemeClr val="bg1"/>
                 </a:solidFill>
@@ -26061,7 +25120,7 @@
             </a:bodyPr>
             <a:lstStyle/>
             <a:p>
-              <a:endParaRPr lang="en-US" sz="1800">
+              <a:endParaRPr lang="en-US" sz="2400">
                 <a:solidFill>
                   <a:schemeClr val="bg1"/>
                 </a:solidFill>
@@ -26116,7 +25175,7 @@
             </a:bodyPr>
             <a:lstStyle/>
             <a:p>
-              <a:endParaRPr lang="en-US" sz="1800">
+              <a:endParaRPr lang="en-US" sz="2400">
                 <a:solidFill>
                   <a:schemeClr val="bg1"/>
                 </a:solidFill>
@@ -26206,10 +25265,10 @@
           </p:nvGrpSpPr>
           <p:grpSpPr>
             <a:xfrm>
-              <a:off x="0" y="0"/>
-              <a:ext cx="2204856" cy="2258900"/>
-              <a:chOff x="0" y="0"/>
-              <a:chExt cx="2205339" cy="2258904"/>
+              <a:off x="-11814" y="0"/>
+              <a:ext cx="2216670" cy="2231320"/>
+              <a:chOff x="-11817" y="0"/>
+              <a:chExt cx="2217156" cy="2231324"/>
             </a:xfrm>
           </p:grpSpPr>
           <p:sp>
@@ -26252,7 +25311,7 @@
                   </a:spcAft>
                 </a:pPr>
                 <a:r>
-                  <a:rPr lang="en-US" sz="800" i="1">
+                  <a:rPr lang="en-US" sz="1000" i="1">
                     <a:solidFill>
                       <a:schemeClr val="bg1"/>
                     </a:solidFill>
@@ -26263,7 +25322,7 @@
                   </a:rPr>
                   <a:t>y</a:t>
                 </a:r>
-                <a:endParaRPr lang="en-US" sz="1050">
+                <a:endParaRPr lang="en-US" sz="1200">
                   <a:solidFill>
                     <a:schemeClr val="bg1"/>
                   </a:solidFill>
@@ -26275,8 +25334,8 @@
               </a:p>
             </p:txBody>
           </p:sp>
-          <mc:AlternateContent xmlns:mc="http://schemas.openxmlformats.org/markup-compatibility/2006" xmlns:a14="http://schemas.microsoft.com/office/drawing/2010/main">
-            <mc:Choice Requires="a14">
+          <mc:AlternateContent xmlns:mc="http://schemas.openxmlformats.org/markup-compatibility/2006">
+            <mc:Choice xmlns:a14="http://schemas.microsoft.com/office/drawing/2010/main" Requires="a14">
               <p:sp>
                 <p:nvSpPr>
                   <p:cNvPr id="518" name="Text Box 9"/>
@@ -26287,7 +25346,7 @@
                 </p:nvSpPr>
                 <p:spPr bwMode="auto">
                   <a:xfrm>
-                    <a:off x="0" y="2048719"/>
+                    <a:off x="-11817" y="2021139"/>
                     <a:ext cx="520700" cy="210185"/>
                   </a:xfrm>
                   <a:prstGeom prst="rect">
@@ -26323,7 +25382,7 @@
                         </m:oMathParaPr>
                         <m:oMath xmlns:m="http://schemas.openxmlformats.org/officeDocument/2006/math">
                           <m:r>
-                            <a:rPr lang="en-US" sz="800" i="1" smtClean="0">
+                            <a:rPr lang="en-US" sz="1000" i="1" smtClean="0">
                               <a:solidFill>
                                 <a:schemeClr val="bg1"/>
                               </a:solidFill>
@@ -26335,7 +25394,7 @@
                             <m:t>−</m:t>
                           </m:r>
                           <m:r>
-                            <a:rPr lang="en-US" sz="800" i="1" smtClean="0">
+                            <a:rPr lang="en-US" sz="1000" i="1" smtClean="0">
                               <a:solidFill>
                                 <a:schemeClr val="bg1"/>
                               </a:solidFill>
@@ -26347,7 +25406,7 @@
                             <m:t>𝐿</m:t>
                           </m:r>
                           <m:r>
-                            <a:rPr lang="en-US" sz="800" i="1" smtClean="0">
+                            <a:rPr lang="en-US" sz="1000" i="1" smtClean="0">
                               <a:solidFill>
                                 <a:schemeClr val="bg1"/>
                               </a:solidFill>
@@ -26361,7 +25420,7 @@
                         </m:oMath>
                       </m:oMathPara>
                     </a14:m>
-                    <a:endParaRPr lang="en-US" sz="1050">
+                    <a:endParaRPr lang="en-US" sz="1200" dirty="0">
                       <a:solidFill>
                         <a:schemeClr val="bg1"/>
                       </a:solidFill>
@@ -26374,7 +25433,7 @@
                 </p:txBody>
               </p:sp>
             </mc:Choice>
-            <mc:Fallback xmlns="">
+            <mc:Fallback>
               <p:sp>
                 <p:nvSpPr>
                   <p:cNvPr id="518" name="Text Box 9"/>
@@ -26385,16 +25444,16 @@
                 </p:nvSpPr>
                 <p:spPr bwMode="auto">
                   <a:xfrm>
-                    <a:off x="0" y="2048719"/>
+                    <a:off x="-11817" y="2021139"/>
                     <a:ext cx="520700" cy="210185"/>
                   </a:xfrm>
                   <a:prstGeom prst="rect">
                     <a:avLst/>
                   </a:prstGeom>
                   <a:blipFill rotWithShape="1">
-                    <a:blip r:embed="rId32"/>
+                    <a:blip r:embed="rId31"/>
                     <a:stretch>
-                      <a:fillRect b="-12121"/>
+                      <a:fillRect b="-26471"/>
                     </a:stretch>
                   </a:blipFill>
                   <a:ln>
@@ -26417,8 +25476,8 @@
               </p:sp>
             </mc:Fallback>
           </mc:AlternateContent>
-          <mc:AlternateContent xmlns:mc="http://schemas.openxmlformats.org/markup-compatibility/2006" xmlns:a14="http://schemas.microsoft.com/office/drawing/2010/main">
-            <mc:Choice Requires="a14">
+          <mc:AlternateContent xmlns:mc="http://schemas.openxmlformats.org/markup-compatibility/2006">
+            <mc:Choice xmlns:a14="http://schemas.microsoft.com/office/drawing/2010/main" Requires="a14">
               <p:sp>
                 <p:nvSpPr>
                   <p:cNvPr id="519" name="Text Box 9"/>
@@ -26429,8 +25488,8 @@
                 </p:nvSpPr>
                 <p:spPr bwMode="auto">
                   <a:xfrm>
-                    <a:off x="115747" y="213889"/>
-                    <a:ext cx="374650" cy="210185"/>
+                    <a:off x="67994" y="190254"/>
+                    <a:ext cx="422404" cy="210185"/>
                   </a:xfrm>
                   <a:prstGeom prst="rect">
                     <a:avLst/>
@@ -26465,7 +25524,7 @@
                         </m:oMathParaPr>
                         <m:oMath xmlns:m="http://schemas.openxmlformats.org/officeDocument/2006/math">
                           <m:r>
-                            <a:rPr lang="en-US" sz="800" i="1" smtClean="0">
+                            <a:rPr lang="en-US" sz="1000" i="1" smtClean="0">
                               <a:solidFill>
                                 <a:schemeClr val="bg1"/>
                               </a:solidFill>
@@ -26477,7 +25536,7 @@
                             <m:t>𝐿</m:t>
                           </m:r>
                           <m:r>
-                            <a:rPr lang="en-US" sz="800" i="1" smtClean="0">
+                            <a:rPr lang="en-US" sz="1000" i="1" smtClean="0">
                               <a:solidFill>
                                 <a:schemeClr val="bg1"/>
                               </a:solidFill>
@@ -26491,7 +25550,7 @@
                         </m:oMath>
                       </m:oMathPara>
                     </a14:m>
-                    <a:endParaRPr lang="en-US" sz="1050" dirty="0">
+                    <a:endParaRPr lang="en-US" sz="1200" dirty="0">
                       <a:solidFill>
                         <a:schemeClr val="bg1"/>
                       </a:solidFill>
@@ -26504,7 +25563,7 @@
                 </p:txBody>
               </p:sp>
             </mc:Choice>
-            <mc:Fallback xmlns="">
+            <mc:Fallback>
               <p:sp>
                 <p:nvSpPr>
                   <p:cNvPr id="519" name="Text Box 9"/>
@@ -26515,16 +25574,16 @@
                 </p:nvSpPr>
                 <p:spPr bwMode="auto">
                   <a:xfrm>
-                    <a:off x="115747" y="213889"/>
-                    <a:ext cx="374650" cy="210185"/>
+                    <a:off x="67994" y="190254"/>
+                    <a:ext cx="422404" cy="210185"/>
                   </a:xfrm>
                   <a:prstGeom prst="rect">
                     <a:avLst/>
                   </a:prstGeom>
                   <a:blipFill rotWithShape="1">
-                    <a:blip r:embed="rId33"/>
+                    <a:blip r:embed="rId32"/>
                     <a:stretch>
-                      <a:fillRect b="-8824"/>
+                      <a:fillRect b="-30303"/>
                     </a:stretch>
                   </a:blipFill>
                   <a:ln>
@@ -26547,8 +25606,8 @@
               </p:sp>
             </mc:Fallback>
           </mc:AlternateContent>
-          <mc:AlternateContent xmlns:mc="http://schemas.openxmlformats.org/markup-compatibility/2006" xmlns:a14="http://schemas.microsoft.com/office/drawing/2010/main">
-            <mc:Choice Requires="a14">
+          <mc:AlternateContent xmlns:mc="http://schemas.openxmlformats.org/markup-compatibility/2006">
+            <mc:Choice xmlns:a14="http://schemas.microsoft.com/office/drawing/2010/main" Requires="a14">
               <p:sp>
                 <p:nvSpPr>
                   <p:cNvPr id="520" name="Text Box 9"/>
@@ -26559,7 +25618,7 @@
                 </p:nvSpPr>
                 <p:spPr bwMode="auto">
                   <a:xfrm>
-                    <a:off x="144684" y="1128532"/>
+                    <a:off x="144684" y="1097018"/>
                     <a:ext cx="308610" cy="210185"/>
                   </a:xfrm>
                   <a:prstGeom prst="rect">
@@ -26595,7 +25654,7 @@
                         </m:oMathParaPr>
                         <m:oMath xmlns:m="http://schemas.openxmlformats.org/officeDocument/2006/math">
                           <m:r>
-                            <a:rPr lang="en-US" sz="800" i="1" smtClean="0">
+                            <a:rPr lang="en-US" sz="1000" i="1" smtClean="0">
                               <a:solidFill>
                                 <a:schemeClr val="bg1"/>
                               </a:solidFill>
@@ -26609,7 +25668,7 @@
                         </m:oMath>
                       </m:oMathPara>
                     </a14:m>
-                    <a:endParaRPr lang="en-US" sz="1050">
+                    <a:endParaRPr lang="en-US" sz="1200" dirty="0">
                       <a:solidFill>
                         <a:schemeClr val="bg1"/>
                       </a:solidFill>
@@ -26622,7 +25681,7 @@
                 </p:txBody>
               </p:sp>
             </mc:Choice>
-            <mc:Fallback xmlns="">
+            <mc:Fallback>
               <p:sp>
                 <p:nvSpPr>
                   <p:cNvPr id="520" name="Text Box 9"/>
@@ -26633,16 +25692,16 @@
                 </p:nvSpPr>
                 <p:spPr bwMode="auto">
                   <a:xfrm>
-                    <a:off x="144684" y="1128532"/>
+                    <a:off x="144684" y="1097018"/>
                     <a:ext cx="308610" cy="210185"/>
                   </a:xfrm>
                   <a:prstGeom prst="rect">
                     <a:avLst/>
                   </a:prstGeom>
                   <a:blipFill rotWithShape="1">
-                    <a:blip r:embed="rId34"/>
+                    <a:blip r:embed="rId33"/>
                     <a:stretch>
-                      <a:fillRect/>
+                      <a:fillRect b="-12121"/>
                     </a:stretch>
                   </a:blipFill>
                   <a:ln>
@@ -26713,7 +25772,7 @@
                         </m:oMathParaPr>
                         <m:oMath xmlns:m="http://schemas.openxmlformats.org/officeDocument/2006/math">
                           <m:r>
-                            <a:rPr lang="en-US" sz="800" i="1" smtClean="0">
+                            <a:rPr lang="en-US" sz="1000" i="1" smtClean="0">
                               <a:solidFill>
                                 <a:schemeClr val="bg1"/>
                               </a:solidFill>
@@ -26728,7 +25787,7 @@
                             <m:accPr>
                               <m:chr m:val="⃗"/>
                               <m:ctrlPr>
-                                <a:rPr lang="en-US" sz="800" i="1">
+                                <a:rPr lang="en-US" sz="1000" i="1">
                                   <a:solidFill>
                                     <a:schemeClr val="bg1"/>
                                   </a:solidFill>
@@ -26741,7 +25800,7 @@
                             </m:accPr>
                             <m:e>
                               <m:r>
-                                <a:rPr lang="en-US" sz="800" i="1">
+                                <a:rPr lang="en-US" sz="1000" i="1">
                                   <a:solidFill>
                                     <a:schemeClr val="bg1"/>
                                   </a:solidFill>
@@ -26757,7 +25816,7 @@
                         </m:oMath>
                       </m:oMathPara>
                     </a14:m>
-                    <a:endParaRPr lang="en-US" sz="1050">
+                    <a:endParaRPr lang="en-US" sz="1200" dirty="0">
                       <a:solidFill>
                         <a:schemeClr val="bg1"/>
                       </a:solidFill>
@@ -26813,8 +25872,8 @@
               </p:sp>
             </mc:Fallback>
           </mc:AlternateContent>
-          <mc:AlternateContent xmlns:mc="http://schemas.openxmlformats.org/markup-compatibility/2006" xmlns:a14="http://schemas.microsoft.com/office/drawing/2010/main">
-            <mc:Choice Requires="a14">
+          <mc:AlternateContent xmlns:mc="http://schemas.openxmlformats.org/markup-compatibility/2006">
+            <mc:Choice xmlns:a14="http://schemas.microsoft.com/office/drawing/2010/main" Requires="a14">
               <p:sp>
                 <p:nvSpPr>
                   <p:cNvPr id="522" name="Text Box 9"/>
@@ -26825,7 +25884,7 @@
                 </p:nvSpPr>
                 <p:spPr bwMode="auto">
                   <a:xfrm>
-                    <a:off x="208345" y="534284"/>
+                    <a:off x="78351" y="506710"/>
                     <a:ext cx="374650" cy="257104"/>
                   </a:xfrm>
                   <a:prstGeom prst="rect">
@@ -26861,7 +25920,7 @@
                         </m:oMathParaPr>
                         <m:oMath xmlns:m="http://schemas.openxmlformats.org/officeDocument/2006/math">
                           <m:r>
-                            <a:rPr lang="en-US" sz="800" i="1" smtClean="0">
+                            <a:rPr lang="en-US" sz="1000" i="1" smtClean="0">
                               <a:solidFill>
                                 <a:schemeClr val="bg1"/>
                               </a:solidFill>
@@ -26875,7 +25934,7 @@
                         </m:oMath>
                       </m:oMathPara>
                     </a14:m>
-                    <a:endParaRPr lang="en-US" sz="1050" dirty="0">
+                    <a:endParaRPr lang="en-US" sz="1200" dirty="0">
                       <a:solidFill>
                         <a:schemeClr val="bg1"/>
                       </a:solidFill>
@@ -26888,7 +25947,7 @@
                 </p:txBody>
               </p:sp>
             </mc:Choice>
-            <mc:Fallback xmlns="">
+            <mc:Fallback>
               <p:sp>
                 <p:nvSpPr>
                   <p:cNvPr id="522" name="Text Box 9"/>
@@ -26899,7 +25958,7 @@
                 </p:nvSpPr>
                 <p:spPr bwMode="auto">
                   <a:xfrm>
-                    <a:off x="208345" y="534284"/>
+                    <a:off x="78351" y="506710"/>
                     <a:ext cx="374650" cy="257104"/>
                   </a:xfrm>
                   <a:prstGeom prst="rect">
@@ -26908,7 +25967,7 @@
                   <a:blipFill rotWithShape="1">
                     <a:blip r:embed="rId36"/>
                     <a:stretch>
-                      <a:fillRect/>
+                      <a:fillRect b="-4878"/>
                     </a:stretch>
                   </a:blipFill>
                   <a:ln>
@@ -26941,7 +26000,7 @@
             </p:nvSpPr>
             <p:spPr bwMode="auto">
               <a:xfrm>
-                <a:off x="318304" y="833377"/>
+                <a:off x="314364" y="813681"/>
                 <a:ext cx="169689" cy="259715"/>
               </a:xfrm>
               <a:prstGeom prst="rect">
@@ -26971,7 +26030,7 @@
                   </a:spcAft>
                 </a:pPr>
                 <a:r>
-                  <a:rPr lang="en-US" sz="800" i="1" dirty="0">
+                  <a:rPr lang="en-US" sz="1000" i="1" dirty="0">
                     <a:solidFill>
                       <a:schemeClr val="bg1"/>
                     </a:solidFill>
@@ -26982,7 +26041,7 @@
                   </a:rPr>
                   <a:t>y</a:t>
                 </a:r>
-                <a:endParaRPr lang="en-US" sz="1050" dirty="0">
+                <a:endParaRPr lang="en-US" sz="1200" dirty="0">
                   <a:solidFill>
                     <a:schemeClr val="bg1"/>
                   </a:solidFill>
@@ -26994,8 +26053,8 @@
               </a:p>
             </p:txBody>
           </p:sp>
-          <mc:AlternateContent xmlns:mc="http://schemas.openxmlformats.org/markup-compatibility/2006" xmlns:a14="http://schemas.microsoft.com/office/drawing/2010/main">
-            <mc:Choice Requires="a14">
+          <mc:AlternateContent xmlns:mc="http://schemas.openxmlformats.org/markup-compatibility/2006">
+            <mc:Choice xmlns:a14="http://schemas.microsoft.com/office/drawing/2010/main" Requires="a14">
               <p:sp>
                 <p:nvSpPr>
                   <p:cNvPr id="524" name="Text Box 9"/>
@@ -27006,7 +26065,125 @@
                 </p:nvSpPr>
                 <p:spPr bwMode="auto">
                   <a:xfrm>
-                    <a:off x="1811438" y="1215342"/>
+                    <a:off x="1831134" y="1199585"/>
+                    <a:ext cx="270511" cy="240030"/>
+                  </a:xfrm>
+                  <a:prstGeom prst="rect">
+                    <a:avLst/>
+                  </a:prstGeom>
+                  <a:noFill/>
+                  <a:ln>
+                    <a:noFill/>
+                  </a:ln>
+                  <a:extLst/>
+                </p:spPr>
+                <p:txBody>
+                  <a:bodyPr rot="0" vert="horz" wrap="square" lIns="91440" tIns="45720" rIns="91440" bIns="45720" anchor="t" anchorCtr="0" upright="1">
+                    <a:noAutofit/>
+                  </a:bodyPr>
+                  <a:lstStyle/>
+                  <a:p>
+                    <a:pPr marL="0" marR="0">
+                      <a:lnSpc>
+                        <a:spcPct val="115000"/>
+                      </a:lnSpc>
+                      <a:spcBef>
+                        <a:spcPts val="0"/>
+                      </a:spcBef>
+                      <a:spcAft>
+                        <a:spcPts val="1000"/>
+                      </a:spcAft>
+                    </a:pPr>
+                    <a14:m>
+                      <m:oMathPara xmlns:m="http://schemas.openxmlformats.org/officeDocument/2006/math">
+                        <m:oMathParaPr>
+                          <m:jc m:val="centerGroup"/>
+                        </m:oMathParaPr>
+                        <m:oMath xmlns:m="http://schemas.openxmlformats.org/officeDocument/2006/math">
+                          <m:r>
+                            <a:rPr lang="en-US" sz="1000" i="1" smtClean="0">
+                              <a:solidFill>
+                                <a:schemeClr val="bg1"/>
+                              </a:solidFill>
+                              <a:effectLst/>
+                              <a:latin typeface="Cambria Math"/>
+                              <a:ea typeface="Calibri"/>
+                              <a:cs typeface="Times New Roman"/>
+                            </a:rPr>
+                            <m:t>𝜃</m:t>
+                          </m:r>
+                        </m:oMath>
+                      </m:oMathPara>
+                    </a14:m>
+                    <a:endParaRPr lang="en-US" sz="1200" dirty="0">
+                      <a:solidFill>
+                        <a:schemeClr val="bg1"/>
+                      </a:solidFill>
+                      <a:effectLst/>
+                      <a:latin typeface="Calibri"/>
+                      <a:ea typeface="Calibri"/>
+                      <a:cs typeface="Times New Roman"/>
+                    </a:endParaRPr>
+                  </a:p>
+                </p:txBody>
+              </p:sp>
+            </mc:Choice>
+            <mc:Fallback>
+              <p:sp>
+                <p:nvSpPr>
+                  <p:cNvPr id="524" name="Text Box 9"/>
+                  <p:cNvSpPr txBox="1">
+                    <a:spLocks noRot="1" noChangeAspect="1" noMove="1" noResize="1" noEditPoints="1" noAdjustHandles="1" noChangeArrowheads="1" noChangeShapeType="1" noTextEdit="1"/>
+                  </p:cNvSpPr>
+                  <p:nvPr/>
+                </p:nvSpPr>
+                <p:spPr bwMode="auto">
+                  <a:xfrm>
+                    <a:off x="1831134" y="1199585"/>
+                    <a:ext cx="270511" cy="240030"/>
+                  </a:xfrm>
+                  <a:prstGeom prst="rect">
+                    <a:avLst/>
+                  </a:prstGeom>
+                  <a:blipFill rotWithShape="1">
+                    <a:blip r:embed="rId37"/>
+                    <a:stretch>
+                      <a:fillRect/>
+                    </a:stretch>
+                  </a:blipFill>
+                  <a:ln>
+                    <a:noFill/>
+                  </a:ln>
+                  <a:extLst/>
+                </p:spPr>
+                <p:txBody>
+                  <a:bodyPr/>
+                  <a:lstStyle/>
+                  <a:p>
+                    <a:r>
+                      <a:rPr lang="en-US">
+                        <a:noFill/>
+                      </a:rPr>
+                      <a:t> </a:t>
+                    </a:r>
+                  </a:p>
+                </p:txBody>
+              </p:sp>
+            </mc:Fallback>
+          </mc:AlternateContent>
+          <mc:AlternateContent xmlns:mc="http://schemas.openxmlformats.org/markup-compatibility/2006">
+            <mc:Choice xmlns:a14="http://schemas.microsoft.com/office/drawing/2010/main" Requires="a14">
+              <p:sp>
+                <p:nvSpPr>
+                  <p:cNvPr id="525" name="Text Box 9"/>
+                  <p:cNvSpPr txBox="1">
+                    <a:spLocks noChangeArrowheads="1"/>
+                  </p:cNvSpPr>
+                  <p:nvPr/>
+                </p:nvSpPr>
+                <p:spPr bwMode="auto">
+                  <a:xfrm>
+                    <a:off x="1116957" y="1008117"/>
                     <a:ext cx="270510" cy="240030"/>
                   </a:xfrm>
                   <a:prstGeom prst="rect">
@@ -27042,7 +26219,7 @@
                         </m:oMathParaPr>
                         <m:oMath xmlns:m="http://schemas.openxmlformats.org/officeDocument/2006/math">
                           <m:r>
-                            <a:rPr lang="en-US" sz="800" i="1" smtClean="0">
+                            <a:rPr lang="en-US" sz="1000" i="1" smtClean="0">
                               <a:solidFill>
                                 <a:schemeClr val="bg1"/>
                               </a:solidFill>
@@ -27056,7 +26233,7 @@
                         </m:oMath>
                       </m:oMathPara>
                     </a14:m>
-                    <a:endParaRPr lang="en-US" sz="1050">
+                    <a:endParaRPr lang="en-US" sz="1200" dirty="0">
                       <a:solidFill>
                         <a:schemeClr val="bg1"/>
                       </a:solidFill>
@@ -27069,125 +26246,7 @@
                 </p:txBody>
               </p:sp>
             </mc:Choice>
-            <mc:Fallback xmlns="">
-              <p:sp>
-                <p:nvSpPr>
-                  <p:cNvPr id="524" name="Text Box 9"/>
-                  <p:cNvSpPr txBox="1">
-                    <a:spLocks noRot="1" noChangeAspect="1" noMove="1" noResize="1" noEditPoints="1" noAdjustHandles="1" noChangeArrowheads="1" noChangeShapeType="1" noTextEdit="1"/>
-                  </p:cNvSpPr>
-                  <p:nvPr/>
-                </p:nvSpPr>
-                <p:spPr bwMode="auto">
-                  <a:xfrm>
-                    <a:off x="1811438" y="1215342"/>
-                    <a:ext cx="270510" cy="240030"/>
-                  </a:xfrm>
-                  <a:prstGeom prst="rect">
-                    <a:avLst/>
-                  </a:prstGeom>
-                  <a:blipFill rotWithShape="1">
-                    <a:blip r:embed="rId37"/>
-                    <a:stretch>
-                      <a:fillRect/>
-                    </a:stretch>
-                  </a:blipFill>
-                  <a:ln>
-                    <a:noFill/>
-                  </a:ln>
-                  <a:extLst/>
-                </p:spPr>
-                <p:txBody>
-                  <a:bodyPr/>
-                  <a:lstStyle/>
-                  <a:p>
-                    <a:r>
-                      <a:rPr lang="en-US">
-                        <a:noFill/>
-                      </a:rPr>
-                      <a:t> </a:t>
-                    </a:r>
-                  </a:p>
-                </p:txBody>
-              </p:sp>
-            </mc:Fallback>
-          </mc:AlternateContent>
-          <mc:AlternateContent xmlns:mc="http://schemas.openxmlformats.org/markup-compatibility/2006" xmlns:a14="http://schemas.microsoft.com/office/drawing/2010/main">
-            <mc:Choice Requires="a14">
-              <p:sp>
-                <p:nvSpPr>
-                  <p:cNvPr id="525" name="Text Box 9"/>
-                  <p:cNvSpPr txBox="1">
-                    <a:spLocks noChangeArrowheads="1"/>
-                  </p:cNvSpPr>
-                  <p:nvPr/>
-                </p:nvSpPr>
-                <p:spPr bwMode="auto">
-                  <a:xfrm>
-                    <a:off x="1116957" y="1047509"/>
-                    <a:ext cx="270510" cy="240030"/>
-                  </a:xfrm>
-                  <a:prstGeom prst="rect">
-                    <a:avLst/>
-                  </a:prstGeom>
-                  <a:noFill/>
-                  <a:ln>
-                    <a:noFill/>
-                  </a:ln>
-                  <a:extLst/>
-                </p:spPr>
-                <p:txBody>
-                  <a:bodyPr rot="0" vert="horz" wrap="square" lIns="91440" tIns="45720" rIns="91440" bIns="45720" anchor="t" anchorCtr="0" upright="1">
-                    <a:noAutofit/>
-                  </a:bodyPr>
-                  <a:lstStyle/>
-                  <a:p>
-                    <a:pPr marL="0" marR="0">
-                      <a:lnSpc>
-                        <a:spcPct val="115000"/>
-                      </a:lnSpc>
-                      <a:spcBef>
-                        <a:spcPts val="0"/>
-                      </a:spcBef>
-                      <a:spcAft>
-                        <a:spcPts val="1000"/>
-                      </a:spcAft>
-                    </a:pPr>
-                    <a14:m>
-                      <m:oMathPara xmlns:m="http://schemas.openxmlformats.org/officeDocument/2006/math">
-                        <m:oMathParaPr>
-                          <m:jc m:val="centerGroup"/>
-                        </m:oMathParaPr>
-                        <m:oMath xmlns:m="http://schemas.openxmlformats.org/officeDocument/2006/math">
-                          <m:r>
-                            <a:rPr lang="en-US" sz="800" i="1" smtClean="0">
-                              <a:solidFill>
-                                <a:schemeClr val="bg1"/>
-                              </a:solidFill>
-                              <a:effectLst/>
-                              <a:latin typeface="Cambria Math"/>
-                              <a:ea typeface="Calibri"/>
-                              <a:cs typeface="Times New Roman"/>
-                            </a:rPr>
-                            <m:t>𝜃</m:t>
-                          </m:r>
-                        </m:oMath>
-                      </m:oMathPara>
-                    </a14:m>
-                    <a:endParaRPr lang="en-US" sz="1050">
-                      <a:solidFill>
-                        <a:schemeClr val="bg1"/>
-                      </a:solidFill>
-                      <a:effectLst/>
-                      <a:latin typeface="Calibri"/>
-                      <a:ea typeface="Calibri"/>
-                      <a:cs typeface="Times New Roman"/>
-                    </a:endParaRPr>
-                  </a:p>
-                </p:txBody>
-              </p:sp>
-            </mc:Choice>
-            <mc:Fallback xmlns="">
+            <mc:Fallback>
               <p:sp>
                 <p:nvSpPr>
                   <p:cNvPr id="525" name="Text Box 9"/>
@@ -27198,7 +26257,7 @@
                 </p:nvSpPr>
                 <p:spPr bwMode="auto">
                   <a:xfrm>
-                    <a:off x="1116957" y="1047509"/>
+                    <a:off x="1116957" y="1008117"/>
                     <a:ext cx="270510" cy="240030"/>
                   </a:xfrm>
                   <a:prstGeom prst="rect">
@@ -27240,7 +26299,7 @@
             </p:nvSpPr>
             <p:spPr bwMode="auto">
               <a:xfrm>
-                <a:off x="1018573" y="1267428"/>
+                <a:off x="1018573" y="1279245"/>
                 <a:ext cx="227330" cy="226695"/>
               </a:xfrm>
               <a:prstGeom prst="rect">
@@ -27258,7 +26317,7 @@
               <a:extLst/>
             </p:spPr>
             <p:txBody>
-              <a:bodyPr rot="0" vert="horz" wrap="square" lIns="91440" tIns="45720" rIns="91440" bIns="45720" anchor="t" anchorCtr="0" upright="1">
+              <a:bodyPr rot="0" vert="horz" wrap="square" lIns="91440" tIns="0" rIns="91440" bIns="45720" anchor="t" anchorCtr="0" upright="1">
                 <a:noAutofit/>
               </a:bodyPr>
               <a:lstStyle/>
@@ -27275,7 +26334,7 @@
                   </a:spcAft>
                 </a:pPr>
                 <a:r>
-                  <a:rPr lang="en-US" sz="800" i="1" dirty="0">
+                  <a:rPr lang="en-US" sz="1000" i="1" dirty="0">
                     <a:solidFill>
                       <a:schemeClr val="bg1"/>
                     </a:solidFill>
@@ -27286,7 +26345,7 @@
                   </a:rPr>
                   <a:t>x</a:t>
                 </a:r>
-                <a:endParaRPr lang="en-US" sz="1050" dirty="0">
+                <a:endParaRPr lang="en-US" sz="1200" dirty="0">
                   <a:solidFill>
                     <a:schemeClr val="bg1"/>
                   </a:solidFill>
@@ -27339,7 +26398,7 @@
       </p:grpSp>
       <p:pic>
         <p:nvPicPr>
-          <p:cNvPr id="1028" name="Picture 4"/>
+          <p:cNvPr id="2" name="Picture 3" descr="C:\Users\mtrawick\Desktop\github\132\StudentGuideModule2\132_front_pages\capacitor2_on_blue_background.tif"/>
           <p:cNvPicPr>
             <a:picLocks noChangeAspect="1" noChangeArrowheads="1"/>
           </p:cNvPicPr>
@@ -27347,16 +26406,6 @@
         </p:nvPicPr>
         <p:blipFill>
           <a:blip r:embed="rId39" cstate="print">
-            <a:clrChange>
-              <a:clrFrom>
-                <a:srgbClr val="000000"/>
-              </a:clrFrom>
-              <a:clrTo>
-                <a:srgbClr val="000000">
-                  <a:alpha val="0"/>
-                </a:srgbClr>
-              </a:clrTo>
-            </a:clrChange>
             <a:extLst>
               <a:ext uri="{28A0092B-C50C-407E-A947-70E740481C1C}">
                 <a14:useLocalDpi xmlns:a14="http://schemas.microsoft.com/office/drawing/2010/main" val="0"/>
@@ -27370,33 +26419,20 @@
         </p:blipFill>
         <p:spPr bwMode="auto">
           <a:xfrm>
-            <a:off x="3372357" y="5039506"/>
-            <a:ext cx="4009957" cy="1920352"/>
+            <a:off x="4899423" y="5679826"/>
+            <a:ext cx="1194182" cy="1198706"/>
           </a:xfrm>
           <a:prstGeom prst="rect">
             <a:avLst/>
           </a:prstGeom>
           <a:noFill/>
-          <a:ln>
-            <a:noFill/>
-          </a:ln>
           <a:extLst>
             <a:ext uri="{909E8E84-426E-40DD-AFC4-6F175D3DCCD1}">
               <a14:hiddenFill xmlns:a14="http://schemas.microsoft.com/office/drawing/2010/main">
                 <a:solidFill>
-                  <a:schemeClr val="accent1"/>
+                  <a:srgbClr val="FFFFFF"/>
                 </a:solidFill>
               </a14:hiddenFill>
-            </a:ext>
-            <a:ext uri="{91240B29-F687-4F45-9708-019B960494DF}">
-              <a14:hiddenLine xmlns:a14="http://schemas.microsoft.com/office/drawing/2010/main" w="9525">
-                <a:solidFill>
-                  <a:schemeClr val="tx1"/>
-                </a:solidFill>
-                <a:miter lim="800000"/>
-                <a:headEnd/>
-                <a:tailEnd/>
-              </a14:hiddenLine>
             </a:ext>
           </a:extLst>
         </p:spPr>

</xml_diff>

<commit_message>
Tweaks to front cover
</commit_message>
<xml_diff>
--- a/StudentGuideModule2/132_front_pages/132_front_cover.pptx
+++ b/StudentGuideModule2/132_front_pages/132_front_cover.pptx
@@ -289,7 +289,7 @@
             <a:fld id="{1D8BD707-D9CF-40AE-B4C6-C98DA3205C09}" type="datetimeFigureOut">
               <a:rPr lang="en-US" smtClean="0"/>
               <a:pPr/>
-              <a:t>4/25/2016</a:t>
+              <a:t>5/1/2016</a:t>
             </a:fld>
             <a:endParaRPr lang="en-US"/>
           </a:p>
@@ -456,7 +456,7 @@
             <a:fld id="{1D8BD707-D9CF-40AE-B4C6-C98DA3205C09}" type="datetimeFigureOut">
               <a:rPr lang="en-US" smtClean="0"/>
               <a:pPr/>
-              <a:t>4/25/2016</a:t>
+              <a:t>5/1/2016</a:t>
             </a:fld>
             <a:endParaRPr lang="en-US"/>
           </a:p>
@@ -633,7 +633,7 @@
             <a:fld id="{1D8BD707-D9CF-40AE-B4C6-C98DA3205C09}" type="datetimeFigureOut">
               <a:rPr lang="en-US" smtClean="0"/>
               <a:pPr/>
-              <a:t>4/25/2016</a:t>
+              <a:t>5/1/2016</a:t>
             </a:fld>
             <a:endParaRPr lang="en-US"/>
           </a:p>
@@ -800,7 +800,7 @@
             <a:fld id="{1D8BD707-D9CF-40AE-B4C6-C98DA3205C09}" type="datetimeFigureOut">
               <a:rPr lang="en-US" smtClean="0"/>
               <a:pPr/>
-              <a:t>4/25/2016</a:t>
+              <a:t>5/1/2016</a:t>
             </a:fld>
             <a:endParaRPr lang="en-US"/>
           </a:p>
@@ -1043,7 +1043,7 @@
             <a:fld id="{1D8BD707-D9CF-40AE-B4C6-C98DA3205C09}" type="datetimeFigureOut">
               <a:rPr lang="en-US" smtClean="0"/>
               <a:pPr/>
-              <a:t>4/25/2016</a:t>
+              <a:t>5/1/2016</a:t>
             </a:fld>
             <a:endParaRPr lang="en-US"/>
           </a:p>
@@ -1328,7 +1328,7 @@
             <a:fld id="{1D8BD707-D9CF-40AE-B4C6-C98DA3205C09}" type="datetimeFigureOut">
               <a:rPr lang="en-US" smtClean="0"/>
               <a:pPr/>
-              <a:t>4/25/2016</a:t>
+              <a:t>5/1/2016</a:t>
             </a:fld>
             <a:endParaRPr lang="en-US"/>
           </a:p>
@@ -1747,7 +1747,7 @@
             <a:fld id="{1D8BD707-D9CF-40AE-B4C6-C98DA3205C09}" type="datetimeFigureOut">
               <a:rPr lang="en-US" smtClean="0"/>
               <a:pPr/>
-              <a:t>4/25/2016</a:t>
+              <a:t>5/1/2016</a:t>
             </a:fld>
             <a:endParaRPr lang="en-US"/>
           </a:p>
@@ -1862,7 +1862,7 @@
             <a:fld id="{1D8BD707-D9CF-40AE-B4C6-C98DA3205C09}" type="datetimeFigureOut">
               <a:rPr lang="en-US" smtClean="0"/>
               <a:pPr/>
-              <a:t>4/25/2016</a:t>
+              <a:t>5/1/2016</a:t>
             </a:fld>
             <a:endParaRPr lang="en-US"/>
           </a:p>
@@ -1954,7 +1954,7 @@
             <a:fld id="{1D8BD707-D9CF-40AE-B4C6-C98DA3205C09}" type="datetimeFigureOut">
               <a:rPr lang="en-US" smtClean="0"/>
               <a:pPr/>
-              <a:t>4/25/2016</a:t>
+              <a:t>5/1/2016</a:t>
             </a:fld>
             <a:endParaRPr lang="en-US"/>
           </a:p>
@@ -2228,7 +2228,7 @@
             <a:fld id="{1D8BD707-D9CF-40AE-B4C6-C98DA3205C09}" type="datetimeFigureOut">
               <a:rPr lang="en-US" smtClean="0"/>
               <a:pPr/>
-              <a:t>4/25/2016</a:t>
+              <a:t>5/1/2016</a:t>
             </a:fld>
             <a:endParaRPr lang="en-US"/>
           </a:p>
@@ -2478,7 +2478,7 @@
             <a:fld id="{1D8BD707-D9CF-40AE-B4C6-C98DA3205C09}" type="datetimeFigureOut">
               <a:rPr lang="en-US" smtClean="0"/>
               <a:pPr/>
-              <a:t>4/25/2016</a:t>
+              <a:t>5/1/2016</a:t>
             </a:fld>
             <a:endParaRPr lang="en-US"/>
           </a:p>
@@ -2688,7 +2688,7 @@
             <a:fld id="{1D8BD707-D9CF-40AE-B4C6-C98DA3205C09}" type="datetimeFigureOut">
               <a:rPr lang="en-US" smtClean="0"/>
               <a:pPr/>
-              <a:t>4/25/2016</a:t>
+              <a:t>5/1/2016</a:t>
             </a:fld>
             <a:endParaRPr lang="en-US"/>
           </a:p>
@@ -8966,25 +8966,16 @@
                     </a:spcAft>
                   </a:pPr>
                   <a:r>
-                    <a:rPr lang="en-US" sz="1100">
+                    <a:rPr lang="en-US" sz="1100" dirty="0">
                       <a:solidFill>
                         <a:schemeClr val="bg1"/>
                       </a:solidFill>
                       <a:effectLst/>
-                      <a:latin typeface="Times New Roman"/>
                       <a:ea typeface="Calibri"/>
                       <a:cs typeface="Times New Roman"/>
                     </a:rPr>
                     <a:t>Laser</a:t>
                   </a:r>
-                  <a:endParaRPr lang="en-US" sz="1100">
-                    <a:solidFill>
-                      <a:schemeClr val="bg1"/>
-                    </a:solidFill>
-                    <a:effectLst/>
-                    <a:ea typeface="Calibri"/>
-                    <a:cs typeface="Times New Roman"/>
-                  </a:endParaRPr>
                 </a:p>
               </p:txBody>
             </p:sp>
@@ -9048,20 +9039,11 @@
                         <a:schemeClr val="bg1"/>
                       </a:solidFill>
                       <a:effectLst/>
-                      <a:latin typeface="Times New Roman"/>
                       <a:ea typeface="Calibri"/>
                       <a:cs typeface="Times New Roman"/>
                     </a:rPr>
                     <a:t>beam</a:t>
                   </a:r>
-                  <a:endParaRPr lang="en-US" sz="1100" dirty="0">
-                    <a:solidFill>
-                      <a:schemeClr val="bg1"/>
-                    </a:solidFill>
-                    <a:effectLst/>
-                    <a:ea typeface="Calibri"/>
-                    <a:cs typeface="Times New Roman"/>
-                  </a:endParaRPr>
                 </a:p>
               </p:txBody>
             </p:sp>
@@ -16515,8 +16497,8 @@
             </a:p>
           </p:txBody>
         </p:sp>
-        <mc:AlternateContent xmlns:mc="http://schemas.openxmlformats.org/markup-compatibility/2006" xmlns:a14="http://schemas.microsoft.com/office/drawing/2010/main">
-          <mc:Choice Requires="a14">
+        <mc:AlternateContent xmlns:mc="http://schemas.openxmlformats.org/markup-compatibility/2006">
+          <mc:Choice xmlns:a14="http://schemas.microsoft.com/office/drawing/2010/main" Requires="a14">
             <p:sp>
               <p:nvSpPr>
                 <p:cNvPr id="428" name="Text Box 160"/>
@@ -16577,7 +16559,6 @@
                         <a:schemeClr val="bg1"/>
                       </a:solidFill>
                       <a:effectLst/>
-                      <a:latin typeface="Times New Roman"/>
                       <a:ea typeface="SimSun"/>
                       <a:cs typeface="Arial"/>
                     </a:rPr>
@@ -16611,7 +16592,7 @@
               </p:txBody>
             </p:sp>
           </mc:Choice>
-          <mc:Fallback xmlns="">
+          <mc:Fallback>
             <p:sp>
               <p:nvSpPr>
                 <p:cNvPr id="428" name="Text Box 160"/>
@@ -19085,8 +19066,8 @@
                 </p:style>
               </p:cxnSp>
             </p:grpSp>
-            <mc:AlternateContent xmlns:mc="http://schemas.openxmlformats.org/markup-compatibility/2006">
-              <mc:Choice xmlns:a14="http://schemas.microsoft.com/office/drawing/2010/main" Requires="a14">
+            <mc:AlternateContent xmlns:mc="http://schemas.openxmlformats.org/markup-compatibility/2006" xmlns:a14="http://schemas.microsoft.com/office/drawing/2010/main">
+              <mc:Choice Requires="a14">
                 <p:sp>
                   <p:nvSpPr>
                     <p:cNvPr id="582" name="Text Box 9"/>
@@ -19192,7 +19173,7 @@
                   </p:txBody>
                 </p:sp>
               </mc:Choice>
-              <mc:Fallback>
+              <mc:Fallback xmlns="">
                 <p:sp>
                   <p:nvSpPr>
                     <p:cNvPr id="582" name="Text Box 9"/>
@@ -19235,8 +19216,8 @@
                 </p:sp>
               </mc:Fallback>
             </mc:AlternateContent>
-            <mc:AlternateContent xmlns:mc="http://schemas.openxmlformats.org/markup-compatibility/2006">
-              <mc:Choice xmlns:a14="http://schemas.microsoft.com/office/drawing/2010/main" Requires="a14">
+            <mc:AlternateContent xmlns:mc="http://schemas.openxmlformats.org/markup-compatibility/2006" xmlns:a14="http://schemas.microsoft.com/office/drawing/2010/main">
+              <mc:Choice Requires="a14">
                 <p:sp>
                   <p:nvSpPr>
                     <p:cNvPr id="583" name="Text Box 10"/>
@@ -19336,7 +19317,7 @@
                   </p:txBody>
                 </p:sp>
               </mc:Choice>
-              <mc:Fallback>
+              <mc:Fallback xmlns="">
                 <p:sp>
                   <p:nvSpPr>
                     <p:cNvPr id="583" name="Text Box 10"/>
@@ -19379,8 +19360,8 @@
                 </p:sp>
               </mc:Fallback>
             </mc:AlternateContent>
-            <mc:AlternateContent xmlns:mc="http://schemas.openxmlformats.org/markup-compatibility/2006">
-              <mc:Choice xmlns:a14="http://schemas.microsoft.com/office/drawing/2010/main" Requires="a14">
+            <mc:AlternateContent xmlns:mc="http://schemas.openxmlformats.org/markup-compatibility/2006" xmlns:a14="http://schemas.microsoft.com/office/drawing/2010/main">
+              <mc:Choice Requires="a14">
                 <p:sp>
                   <p:nvSpPr>
                     <p:cNvPr id="584" name="Text Box 11"/>
@@ -19480,7 +19461,7 @@
                   </p:txBody>
                 </p:sp>
               </mc:Choice>
-              <mc:Fallback>
+              <mc:Fallback xmlns="">
                 <p:sp>
                   <p:nvSpPr>
                     <p:cNvPr id="584" name="Text Box 11"/>
@@ -19523,8 +19504,8 @@
                 </p:sp>
               </mc:Fallback>
             </mc:AlternateContent>
-            <mc:AlternateContent xmlns:mc="http://schemas.openxmlformats.org/markup-compatibility/2006">
-              <mc:Choice xmlns:a14="http://schemas.microsoft.com/office/drawing/2010/main" Requires="a14">
+            <mc:AlternateContent xmlns:mc="http://schemas.openxmlformats.org/markup-compatibility/2006" xmlns:a14="http://schemas.microsoft.com/office/drawing/2010/main">
+              <mc:Choice Requires="a14">
                 <p:sp>
                   <p:nvSpPr>
                     <p:cNvPr id="585" name="Text Box 12"/>
@@ -19612,7 +19593,7 @@
                   </p:txBody>
                 </p:sp>
               </mc:Choice>
-              <mc:Fallback>
+              <mc:Fallback xmlns="">
                 <p:sp>
                   <p:nvSpPr>
                     <p:cNvPr id="585" name="Text Box 12"/>
@@ -20789,11 +20770,22 @@
                           <a:schemeClr val="bg1"/>
                         </a:solidFill>
                         <a:effectLst/>
+                        <a:ea typeface="Times New Roman"/>
+                        <a:cs typeface="Times New Roman"/>
+                      </a:rPr>
+                      <a:t>Area</a:t>
+                    </a:r>
+                    <a:r>
+                      <a:rPr lang="en-US" sz="1050" dirty="0" smtClean="0">
+                        <a:solidFill>
+                          <a:schemeClr val="bg1"/>
+                        </a:solidFill>
+                        <a:effectLst/>
                         <a:latin typeface="Times New Roman"/>
                         <a:ea typeface="Times New Roman"/>
                         <a:cs typeface="Times New Roman"/>
                       </a:rPr>
-                      <a:t>Area </a:t>
+                      <a:t> </a:t>
                     </a:r>
                     <a14:m>
                       <m:oMath xmlns:m="http://schemas.openxmlformats.org/officeDocument/2006/math">
@@ -20843,7 +20835,7 @@
                   <a:blipFill rotWithShape="1">
                     <a:blip r:embed="rId22"/>
                     <a:stretch>
-                      <a:fillRect b="-4255"/>
+                      <a:fillRect b="-6383"/>
                     </a:stretch>
                   </a:blipFill>
                   <a:ln w="6350">
@@ -25334,8 +25326,8 @@
               </a:p>
             </p:txBody>
           </p:sp>
-          <mc:AlternateContent xmlns:mc="http://schemas.openxmlformats.org/markup-compatibility/2006">
-            <mc:Choice xmlns:a14="http://schemas.microsoft.com/office/drawing/2010/main" Requires="a14">
+          <mc:AlternateContent xmlns:mc="http://schemas.openxmlformats.org/markup-compatibility/2006" xmlns:a14="http://schemas.microsoft.com/office/drawing/2010/main">
+            <mc:Choice Requires="a14">
               <p:sp>
                 <p:nvSpPr>
                   <p:cNvPr id="518" name="Text Box 9"/>
@@ -25433,7 +25425,7 @@
                 </p:txBody>
               </p:sp>
             </mc:Choice>
-            <mc:Fallback>
+            <mc:Fallback xmlns="">
               <p:sp>
                 <p:nvSpPr>
                   <p:cNvPr id="518" name="Text Box 9"/>
@@ -25476,8 +25468,8 @@
               </p:sp>
             </mc:Fallback>
           </mc:AlternateContent>
-          <mc:AlternateContent xmlns:mc="http://schemas.openxmlformats.org/markup-compatibility/2006">
-            <mc:Choice xmlns:a14="http://schemas.microsoft.com/office/drawing/2010/main" Requires="a14">
+          <mc:AlternateContent xmlns:mc="http://schemas.openxmlformats.org/markup-compatibility/2006" xmlns:a14="http://schemas.microsoft.com/office/drawing/2010/main">
+            <mc:Choice Requires="a14">
               <p:sp>
                 <p:nvSpPr>
                   <p:cNvPr id="519" name="Text Box 9"/>
@@ -25563,7 +25555,7 @@
                 </p:txBody>
               </p:sp>
             </mc:Choice>
-            <mc:Fallback>
+            <mc:Fallback xmlns="">
               <p:sp>
                 <p:nvSpPr>
                   <p:cNvPr id="519" name="Text Box 9"/>
@@ -25606,8 +25598,8 @@
               </p:sp>
             </mc:Fallback>
           </mc:AlternateContent>
-          <mc:AlternateContent xmlns:mc="http://schemas.openxmlformats.org/markup-compatibility/2006">
-            <mc:Choice xmlns:a14="http://schemas.microsoft.com/office/drawing/2010/main" Requires="a14">
+          <mc:AlternateContent xmlns:mc="http://schemas.openxmlformats.org/markup-compatibility/2006" xmlns:a14="http://schemas.microsoft.com/office/drawing/2010/main">
+            <mc:Choice Requires="a14">
               <p:sp>
                 <p:nvSpPr>
                   <p:cNvPr id="520" name="Text Box 9"/>
@@ -25681,7 +25673,7 @@
                 </p:txBody>
               </p:sp>
             </mc:Choice>
-            <mc:Fallback>
+            <mc:Fallback xmlns="">
               <p:sp>
                 <p:nvSpPr>
                   <p:cNvPr id="520" name="Text Box 9"/>
@@ -25872,8 +25864,8 @@
               </p:sp>
             </mc:Fallback>
           </mc:AlternateContent>
-          <mc:AlternateContent xmlns:mc="http://schemas.openxmlformats.org/markup-compatibility/2006">
-            <mc:Choice xmlns:a14="http://schemas.microsoft.com/office/drawing/2010/main" Requires="a14">
+          <mc:AlternateContent xmlns:mc="http://schemas.openxmlformats.org/markup-compatibility/2006" xmlns:a14="http://schemas.microsoft.com/office/drawing/2010/main">
+            <mc:Choice Requires="a14">
               <p:sp>
                 <p:nvSpPr>
                   <p:cNvPr id="522" name="Text Box 9"/>
@@ -25947,7 +25939,7 @@
                 </p:txBody>
               </p:sp>
             </mc:Choice>
-            <mc:Fallback>
+            <mc:Fallback xmlns="">
               <p:sp>
                 <p:nvSpPr>
                   <p:cNvPr id="522" name="Text Box 9"/>
@@ -26053,8 +26045,8 @@
               </a:p>
             </p:txBody>
           </p:sp>
-          <mc:AlternateContent xmlns:mc="http://schemas.openxmlformats.org/markup-compatibility/2006">
-            <mc:Choice xmlns:a14="http://schemas.microsoft.com/office/drawing/2010/main" Requires="a14">
+          <mc:AlternateContent xmlns:mc="http://schemas.openxmlformats.org/markup-compatibility/2006" xmlns:a14="http://schemas.microsoft.com/office/drawing/2010/main">
+            <mc:Choice Requires="a14">
               <p:sp>
                 <p:nvSpPr>
                   <p:cNvPr id="524" name="Text Box 9"/>
@@ -26128,7 +26120,7 @@
                 </p:txBody>
               </p:sp>
             </mc:Choice>
-            <mc:Fallback>
+            <mc:Fallback xmlns="">
               <p:sp>
                 <p:nvSpPr>
                   <p:cNvPr id="524" name="Text Box 9"/>
@@ -26171,8 +26163,8 @@
               </p:sp>
             </mc:Fallback>
           </mc:AlternateContent>
-          <mc:AlternateContent xmlns:mc="http://schemas.openxmlformats.org/markup-compatibility/2006">
-            <mc:Choice xmlns:a14="http://schemas.microsoft.com/office/drawing/2010/main" Requires="a14">
+          <mc:AlternateContent xmlns:mc="http://schemas.openxmlformats.org/markup-compatibility/2006" xmlns:a14="http://schemas.microsoft.com/office/drawing/2010/main">
+            <mc:Choice Requires="a14">
               <p:sp>
                 <p:nvSpPr>
                   <p:cNvPr id="525" name="Text Box 9"/>
@@ -26246,7 +26238,7 @@
                 </p:txBody>
               </p:sp>
             </mc:Choice>
-            <mc:Fallback>
+            <mc:Fallback xmlns="">
               <p:sp>
                 <p:nvSpPr>
                   <p:cNvPr id="525" name="Text Box 9"/>

</xml_diff>